<commit_message>
Modifications in RDBMS diagram and backup of soldata DB.
git-svn-id: svn+ssh://savannah01.psi.ch/repos/gems/GEMSFIT/branches/devDanFit@103 376c6ad0-4da0-11e1-87d0-276bdbf53620
</commit_message>
<xml_diff>
--- a/docs/RDBMS structure.pptx
+++ b/docs/RDBMS structure.pptx
@@ -3097,6 +3097,44 @@
       </p:grpSpPr>
       <p:cxnSp>
         <p:nvCxnSpPr>
+          <p:cNvPr id="216" name="Elbow Connector 215"/>
+          <p:cNvCxnSpPr>
+            <a:stCxn id="205" idx="1"/>
+            <a:endCxn id="215" idx="3"/>
+          </p:cNvCxnSpPr>
+          <p:nvPr/>
+        </p:nvCxnSpPr>
+        <p:spPr>
+          <a:xfrm rot="10800000" flipV="1">
+            <a:off x="6011334" y="1170821"/>
+            <a:ext cx="2971313" cy="4364358"/>
+          </a:xfrm>
+          <a:prstGeom prst="bentConnector3">
+            <a:avLst>
+              <a:gd name="adj1" fmla="val 19796"/>
+            </a:avLst>
+          </a:prstGeom>
+          <a:ln w="12700">
+            <a:tailEnd type="arrow"/>
+          </a:ln>
+        </p:spPr>
+        <p:style>
+          <a:lnRef idx="1">
+            <a:schemeClr val="dk1"/>
+          </a:lnRef>
+          <a:fillRef idx="0">
+            <a:schemeClr val="dk1"/>
+          </a:fillRef>
+          <a:effectRef idx="0">
+            <a:schemeClr val="dk1"/>
+          </a:effectRef>
+          <a:fontRef idx="minor">
+            <a:schemeClr val="tx1"/>
+          </a:fontRef>
+        </p:style>
+      </p:cxnSp>
+      <p:cxnSp>
+        <p:nvCxnSpPr>
           <p:cNvPr id="333" name="Elbow Connector 332"/>
           <p:cNvCxnSpPr>
             <a:stCxn id="38" idx="3"/>
@@ -3106,8 +3144,8 @@
         </p:nvCxnSpPr>
         <p:spPr>
           <a:xfrm>
-            <a:off x="3971993" y="7200231"/>
-            <a:ext cx="5010618" cy="232749"/>
+            <a:off x="3877733" y="6689692"/>
+            <a:ext cx="5104889" cy="898851"/>
           </a:xfrm>
           <a:prstGeom prst="bentConnector3">
             <a:avLst>
@@ -3144,12 +3182,12 @@
         </p:nvCxnSpPr>
         <p:spPr>
           <a:xfrm flipV="1">
-            <a:off x="3971993" y="4735986"/>
-            <a:ext cx="5010618" cy="2464245"/>
+            <a:off x="3877733" y="5427351"/>
+            <a:ext cx="5104900" cy="1262341"/>
           </a:xfrm>
           <a:prstGeom prst="bentConnector3">
             <a:avLst>
-              <a:gd name="adj1" fmla="val 48751"/>
+              <a:gd name="adj1" fmla="val 50000"/>
             </a:avLst>
           </a:prstGeom>
           <a:ln>
@@ -3182,12 +3220,12 @@
         </p:nvCxnSpPr>
         <p:spPr>
           <a:xfrm flipV="1">
-            <a:off x="1964513" y="4104478"/>
-            <a:ext cx="2885798" cy="260898"/>
+            <a:off x="1828800" y="4061044"/>
+            <a:ext cx="3021511" cy="740176"/>
           </a:xfrm>
           <a:prstGeom prst="bentConnector3">
             <a:avLst>
-              <a:gd name="adj1" fmla="val 75723"/>
+              <a:gd name="adj1" fmla="val 50000"/>
             </a:avLst>
           </a:prstGeom>
           <a:ln>
@@ -3217,12 +3255,13 @@
         </p:nvSpPr>
         <p:spPr>
           <a:xfrm>
-            <a:off x="709089" y="656870"/>
-            <a:ext cx="1255428" cy="306601"/>
+            <a:off x="709098" y="2024538"/>
+            <a:ext cx="1119711" cy="218380"/>
           </a:xfrm>
           <a:prstGeom prst="flowChartAlternateProcess">
             <a:avLst/>
           </a:prstGeom>
+          <a:ln w="12700"/>
         </p:spPr>
         <p:style>
           <a:lnRef idx="2">
@@ -3258,8 +3297,8 @@
         </p:nvSpPr>
         <p:spPr>
           <a:xfrm>
-            <a:off x="709089" y="963471"/>
-            <a:ext cx="1255428" cy="287751"/>
+            <a:off x="709098" y="2246612"/>
+            <a:ext cx="1119711" cy="195564"/>
           </a:xfrm>
           <a:prstGeom prst="flowChartPredefinedProcess">
             <a:avLst/>
@@ -3270,6 +3309,7 @@
               <a:lumOff val="80000"/>
             </a:schemeClr>
           </a:solidFill>
+          <a:ln w="12700"/>
         </p:spPr>
         <p:style>
           <a:lnRef idx="2">
@@ -3306,12 +3346,13 @@
         </p:nvSpPr>
         <p:spPr>
           <a:xfrm>
-            <a:off x="709089" y="1251222"/>
-            <a:ext cx="1255428" cy="317518"/>
+            <a:off x="709098" y="2442175"/>
+            <a:ext cx="1119711" cy="222073"/>
           </a:xfrm>
           <a:prstGeom prst="flowChartProcess">
             <a:avLst/>
           </a:prstGeom>
+          <a:ln w="12700"/>
         </p:spPr>
         <p:style>
           <a:lnRef idx="2">
@@ -3348,12 +3389,13 @@
         </p:nvSpPr>
         <p:spPr>
           <a:xfrm>
-            <a:off x="709085" y="3920358"/>
-            <a:ext cx="1255428" cy="306601"/>
+            <a:off x="709085" y="4484116"/>
+            <a:ext cx="1119715" cy="215150"/>
           </a:xfrm>
           <a:prstGeom prst="flowChartAlternateProcess">
             <a:avLst/>
           </a:prstGeom>
+          <a:ln w="12700"/>
         </p:spPr>
         <p:style>
           <a:lnRef idx="2">
@@ -3390,8 +3432,8 @@
         </p:nvSpPr>
         <p:spPr>
           <a:xfrm>
-            <a:off x="709085" y="4221500"/>
-            <a:ext cx="1255428" cy="287751"/>
+            <a:off x="709085" y="4699266"/>
+            <a:ext cx="1119715" cy="203908"/>
           </a:xfrm>
           <a:prstGeom prst="flowChartPredefinedProcess">
             <a:avLst/>
@@ -3402,6 +3444,7 @@
               <a:lumOff val="80000"/>
             </a:schemeClr>
           </a:solidFill>
+          <a:ln w="12700"/>
         </p:spPr>
         <p:style>
           <a:lnRef idx="2">
@@ -3441,15 +3484,15 @@
         </p:nvCxnSpPr>
         <p:spPr>
           <a:xfrm>
-            <a:off x="1964517" y="1107347"/>
-            <a:ext cx="739347" cy="2726809"/>
+            <a:off x="1828809" y="2344394"/>
+            <a:ext cx="875054" cy="744304"/>
           </a:xfrm>
           <a:prstGeom prst="bentConnector3">
             <a:avLst>
               <a:gd name="adj1" fmla="val 50000"/>
             </a:avLst>
           </a:prstGeom>
-          <a:ln>
+          <a:ln w="12700">
             <a:tailEnd type="arrow"/>
           </a:ln>
         </p:spPr>
@@ -3476,12 +3519,13 @@
         </p:nvSpPr>
         <p:spPr>
           <a:xfrm>
-            <a:off x="709089" y="1568740"/>
-            <a:ext cx="1255428" cy="317518"/>
+            <a:off x="709091" y="2635221"/>
+            <a:ext cx="1119718" cy="216615"/>
           </a:xfrm>
           <a:prstGeom prst="flowChartProcess">
             <a:avLst/>
           </a:prstGeom>
+          <a:ln w="12700"/>
         </p:spPr>
         <p:style>
           <a:lnRef idx="2">
@@ -3518,12 +3562,13 @@
         </p:nvSpPr>
         <p:spPr>
           <a:xfrm>
-            <a:off x="709089" y="1886258"/>
-            <a:ext cx="1255428" cy="317518"/>
+            <a:off x="709091" y="3058053"/>
+            <a:ext cx="1119718" cy="221358"/>
           </a:xfrm>
           <a:prstGeom prst="flowChartProcess">
             <a:avLst/>
           </a:prstGeom>
+          <a:ln w="12700"/>
         </p:spPr>
         <p:style>
           <a:lnRef idx="2">
@@ -3560,12 +3605,13 @@
         </p:nvSpPr>
         <p:spPr>
           <a:xfrm>
-            <a:off x="709089" y="2203776"/>
-            <a:ext cx="1255428" cy="317518"/>
+            <a:off x="709098" y="3284250"/>
+            <a:ext cx="1119711" cy="215760"/>
           </a:xfrm>
           <a:prstGeom prst="flowChartProcess">
             <a:avLst/>
           </a:prstGeom>
+          <a:ln w="12700"/>
         </p:spPr>
         <p:style>
           <a:lnRef idx="2">
@@ -3602,12 +3648,13 @@
         </p:nvSpPr>
         <p:spPr>
           <a:xfrm>
-            <a:off x="709089" y="2528421"/>
-            <a:ext cx="1255428" cy="317518"/>
+            <a:off x="709091" y="3500010"/>
+            <a:ext cx="1119718" cy="208633"/>
           </a:xfrm>
           <a:prstGeom prst="flowChartProcess">
             <a:avLst/>
           </a:prstGeom>
+          <a:ln w="12700"/>
         </p:spPr>
         <p:style>
           <a:lnRef idx="2">
@@ -3644,12 +3691,13 @@
         </p:nvSpPr>
         <p:spPr>
           <a:xfrm>
-            <a:off x="709089" y="2845939"/>
-            <a:ext cx="1255428" cy="317518"/>
+            <a:off x="709091" y="2851836"/>
+            <a:ext cx="1119718" cy="210832"/>
           </a:xfrm>
           <a:prstGeom prst="flowChartProcess">
             <a:avLst/>
           </a:prstGeom>
+          <a:ln w="12700"/>
         </p:spPr>
         <p:style>
           <a:lnRef idx="2">
@@ -3686,12 +3734,13 @@
         </p:nvSpPr>
         <p:spPr>
           <a:xfrm>
-            <a:off x="709089" y="3163457"/>
-            <a:ext cx="1255428" cy="317518"/>
+            <a:off x="709091" y="3708643"/>
+            <a:ext cx="1119718" cy="224424"/>
           </a:xfrm>
           <a:prstGeom prst="flowChartProcess">
             <a:avLst/>
           </a:prstGeom>
+          <a:ln w="12700"/>
         </p:spPr>
         <p:style>
           <a:lnRef idx="2">
@@ -3728,12 +3777,13 @@
         </p:nvSpPr>
         <p:spPr>
           <a:xfrm>
-            <a:off x="709085" y="4826769"/>
-            <a:ext cx="1255428" cy="317518"/>
+            <a:off x="709089" y="5104581"/>
+            <a:ext cx="1119715" cy="230866"/>
           </a:xfrm>
           <a:prstGeom prst="flowChartProcess">
             <a:avLst/>
           </a:prstGeom>
+          <a:ln w="12700"/>
         </p:spPr>
         <p:style>
           <a:lnRef idx="2">
@@ -3770,12 +3820,13 @@
         </p:nvSpPr>
         <p:spPr>
           <a:xfrm>
-            <a:off x="709085" y="4509251"/>
-            <a:ext cx="1255428" cy="317518"/>
+            <a:off x="709085" y="4907152"/>
+            <a:ext cx="1119715" cy="197428"/>
           </a:xfrm>
           <a:prstGeom prst="flowChartProcess">
             <a:avLst/>
           </a:prstGeom>
+          <a:ln w="12700"/>
         </p:spPr>
         <p:style>
           <a:lnRef idx="2">
@@ -3812,12 +3863,13 @@
         </p:nvSpPr>
         <p:spPr>
           <a:xfrm>
-            <a:off x="709083" y="7224800"/>
-            <a:ext cx="1255428" cy="317518"/>
+            <a:off x="709089" y="6763840"/>
+            <a:ext cx="1119717" cy="240869"/>
           </a:xfrm>
           <a:prstGeom prst="flowChartProcess">
             <a:avLst/>
           </a:prstGeom>
+          <a:ln w="12700"/>
         </p:spPr>
         <p:style>
           <a:lnRef idx="2">
@@ -3854,12 +3906,13 @@
         </p:nvSpPr>
         <p:spPr>
           <a:xfrm>
-            <a:off x="709089" y="6907282"/>
-            <a:ext cx="1255428" cy="317518"/>
+            <a:off x="709082" y="6543704"/>
+            <a:ext cx="1119715" cy="220000"/>
           </a:xfrm>
           <a:prstGeom prst="flowChartProcess">
             <a:avLst/>
           </a:prstGeom>
+          <a:ln w="12700"/>
         </p:spPr>
         <p:style>
           <a:lnRef idx="2">
@@ -3896,12 +3949,13 @@
         </p:nvSpPr>
         <p:spPr>
           <a:xfrm>
-            <a:off x="2703864" y="3395542"/>
-            <a:ext cx="1255428" cy="306601"/>
+            <a:off x="2703863" y="2776111"/>
+            <a:ext cx="1097670" cy="226920"/>
           </a:xfrm>
           <a:prstGeom prst="flowChartAlternateProcess">
             <a:avLst/>
           </a:prstGeom>
+          <a:ln w="12700"/>
         </p:spPr>
         <p:style>
           <a:lnRef idx="2">
@@ -3942,8 +3996,8 @@
         </p:nvSpPr>
         <p:spPr>
           <a:xfrm>
-            <a:off x="2703864" y="3701871"/>
-            <a:ext cx="1255428" cy="264570"/>
+            <a:off x="2703863" y="2991781"/>
+            <a:ext cx="1097670" cy="193834"/>
           </a:xfrm>
           <a:prstGeom prst="flowChartPunchedCard">
             <a:avLst/>
@@ -3954,6 +4008,7 @@
               <a:lumOff val="80000"/>
             </a:schemeClr>
           </a:solidFill>
+          <a:ln w="12700"/>
         </p:spPr>
         <p:style>
           <a:lnRef idx="2">
@@ -3994,8 +4049,8 @@
         </p:nvSpPr>
         <p:spPr>
           <a:xfrm>
-            <a:off x="2703864" y="3966441"/>
-            <a:ext cx="1255428" cy="264570"/>
+            <a:off x="2703863" y="3185616"/>
+            <a:ext cx="1097670" cy="215954"/>
           </a:xfrm>
           <a:prstGeom prst="flowChartPunchedCard">
             <a:avLst/>
@@ -4006,6 +4061,7 @@
               <a:lumOff val="80000"/>
             </a:schemeClr>
           </a:solidFill>
+          <a:ln w="12700"/>
         </p:spPr>
         <p:style>
           <a:lnRef idx="2">
@@ -4045,15 +4101,15 @@
         </p:nvCxnSpPr>
         <p:spPr>
           <a:xfrm flipV="1">
-            <a:off x="1964513" y="4098726"/>
-            <a:ext cx="739351" cy="266650"/>
+            <a:off x="1828800" y="3293593"/>
+            <a:ext cx="875063" cy="1507627"/>
           </a:xfrm>
           <a:prstGeom prst="bentConnector3">
             <a:avLst>
               <a:gd name="adj1" fmla="val 50000"/>
             </a:avLst>
           </a:prstGeom>
-          <a:ln>
+          <a:ln w="12700">
             <a:tailEnd type="arrow"/>
           </a:ln>
         </p:spPr>
@@ -4080,12 +4136,13 @@
         </p:nvSpPr>
         <p:spPr>
           <a:xfrm>
-            <a:off x="2703864" y="4225521"/>
-            <a:ext cx="1255428" cy="317518"/>
+            <a:off x="2703863" y="3403800"/>
+            <a:ext cx="1097670" cy="268388"/>
           </a:xfrm>
           <a:prstGeom prst="flowChartProcess">
             <a:avLst/>
           </a:prstGeom>
+          <a:ln w="12700"/>
         </p:spPr>
         <p:style>
           <a:lnRef idx="2">
@@ -4122,12 +4179,13 @@
         </p:nvSpPr>
         <p:spPr>
           <a:xfrm>
-            <a:off x="2716565" y="6753981"/>
-            <a:ext cx="1255428" cy="306601"/>
+            <a:off x="2729264" y="6339020"/>
+            <a:ext cx="1148469" cy="259657"/>
           </a:xfrm>
           <a:prstGeom prst="flowChartAlternateProcess">
             <a:avLst/>
           </a:prstGeom>
+          <a:ln w="12700"/>
         </p:spPr>
         <p:style>
           <a:lnRef idx="2">
@@ -4164,8 +4222,8 @@
         </p:nvSpPr>
         <p:spPr>
           <a:xfrm>
-            <a:off x="2716565" y="7056355"/>
-            <a:ext cx="1255428" cy="287751"/>
+            <a:off x="2729264" y="6590559"/>
+            <a:ext cx="1148469" cy="198266"/>
           </a:xfrm>
           <a:prstGeom prst="flowChartPredefinedProcess">
             <a:avLst/>
@@ -4176,6 +4234,7 @@
               <a:lumOff val="80000"/>
             </a:schemeClr>
           </a:solidFill>
+          <a:ln w="12700"/>
         </p:spPr>
         <p:style>
           <a:lnRef idx="2">
@@ -4212,12 +4271,13 @@
         </p:nvSpPr>
         <p:spPr>
           <a:xfrm>
-            <a:off x="2716565" y="8297695"/>
-            <a:ext cx="1255428" cy="317518"/>
+            <a:off x="2729266" y="7620607"/>
+            <a:ext cx="1148469" cy="277896"/>
           </a:xfrm>
           <a:prstGeom prst="flowChartProcess">
             <a:avLst/>
           </a:prstGeom>
+          <a:ln w="12700"/>
         </p:spPr>
         <p:style>
           <a:lnRef idx="2">
@@ -4254,12 +4314,13 @@
         </p:nvSpPr>
         <p:spPr>
           <a:xfrm>
-            <a:off x="2716565" y="7344106"/>
-            <a:ext cx="1255428" cy="317518"/>
+            <a:off x="2729264" y="6788825"/>
+            <a:ext cx="1148469" cy="246048"/>
           </a:xfrm>
           <a:prstGeom prst="flowChartProcess">
             <a:avLst/>
           </a:prstGeom>
+          <a:ln w="12700"/>
         </p:spPr>
         <p:style>
           <a:lnRef idx="2">
@@ -4296,12 +4357,13 @@
         </p:nvSpPr>
         <p:spPr>
           <a:xfrm>
-            <a:off x="2716565" y="7661624"/>
-            <a:ext cx="1255428" cy="317518"/>
+            <a:off x="2729266" y="7034873"/>
+            <a:ext cx="1148469" cy="264570"/>
           </a:xfrm>
           <a:prstGeom prst="flowChartProcess">
             <a:avLst/>
           </a:prstGeom>
+          <a:ln w="12700"/>
         </p:spPr>
         <p:style>
           <a:lnRef idx="2">
@@ -4338,12 +4400,13 @@
         </p:nvSpPr>
         <p:spPr>
           <a:xfrm>
-            <a:off x="2716565" y="7980177"/>
-            <a:ext cx="1255428" cy="317518"/>
+            <a:off x="2729266" y="7293334"/>
+            <a:ext cx="1148469" cy="273393"/>
           </a:xfrm>
           <a:prstGeom prst="flowChartProcess">
             <a:avLst/>
           </a:prstGeom>
+          <a:ln w="12700"/>
         </p:spPr>
         <p:style>
           <a:lnRef idx="2">
@@ -4380,12 +4443,13 @@
         </p:nvSpPr>
         <p:spPr>
           <a:xfrm>
-            <a:off x="2703864" y="5212376"/>
-            <a:ext cx="1255428" cy="306601"/>
+            <a:off x="2703864" y="5063397"/>
+            <a:ext cx="1255427" cy="236003"/>
           </a:xfrm>
           <a:prstGeom prst="flowChartAlternateProcess">
             <a:avLst/>
           </a:prstGeom>
+          <a:ln w="12700"/>
         </p:spPr>
         <p:style>
           <a:lnRef idx="2">
@@ -4422,8 +4486,8 @@
         </p:nvSpPr>
         <p:spPr>
           <a:xfrm>
-            <a:off x="2703864" y="5507950"/>
-            <a:ext cx="1255428" cy="264570"/>
+            <a:off x="2703864" y="5299401"/>
+            <a:ext cx="1255427" cy="224538"/>
           </a:xfrm>
           <a:prstGeom prst="flowChartPunchedCard">
             <a:avLst/>
@@ -4434,6 +4498,7 @@
               <a:lumOff val="80000"/>
             </a:schemeClr>
           </a:solidFill>
+          <a:ln w="12700"/>
         </p:spPr>
         <p:style>
           <a:lnRef idx="2">
@@ -4470,8 +4535,8 @@
         </p:nvSpPr>
         <p:spPr>
           <a:xfrm>
-            <a:off x="2703864" y="5772520"/>
-            <a:ext cx="1255428" cy="264570"/>
+            <a:off x="2703863" y="5528427"/>
+            <a:ext cx="1255427" cy="221846"/>
           </a:xfrm>
           <a:prstGeom prst="flowChartPunchedCard">
             <a:avLst/>
@@ -4482,6 +4547,7 @@
               <a:lumOff val="80000"/>
             </a:schemeClr>
           </a:solidFill>
+          <a:ln w="12700"/>
         </p:spPr>
         <p:style>
           <a:lnRef idx="2">
@@ -4518,12 +4584,13 @@
         </p:nvSpPr>
         <p:spPr>
           <a:xfrm>
-            <a:off x="709086" y="5738703"/>
-            <a:ext cx="1255428" cy="306601"/>
+            <a:off x="709086" y="5742541"/>
+            <a:ext cx="1119718" cy="203460"/>
           </a:xfrm>
           <a:prstGeom prst="flowChartAlternateProcess">
             <a:avLst/>
           </a:prstGeom>
+          <a:ln w="12700"/>
         </p:spPr>
         <p:style>
           <a:lnRef idx="2">
@@ -4560,8 +4627,8 @@
         </p:nvSpPr>
         <p:spPr>
           <a:xfrm>
-            <a:off x="709086" y="6039845"/>
-            <a:ext cx="1255428" cy="287751"/>
+            <a:off x="709086" y="5948689"/>
+            <a:ext cx="1119718" cy="219836"/>
           </a:xfrm>
           <a:prstGeom prst="flowChartPredefinedProcess">
             <a:avLst/>
@@ -4572,6 +4639,7 @@
               <a:lumOff val="80000"/>
             </a:schemeClr>
           </a:solidFill>
+          <a:ln w="12700"/>
         </p:spPr>
         <p:style>
           <a:lnRef idx="2">
@@ -4608,12 +4676,13 @@
         </p:nvSpPr>
         <p:spPr>
           <a:xfrm>
-            <a:off x="709089" y="6589764"/>
-            <a:ext cx="1255428" cy="317518"/>
+            <a:off x="709089" y="6339852"/>
+            <a:ext cx="1119711" cy="199501"/>
           </a:xfrm>
           <a:prstGeom prst="flowChartProcess">
             <a:avLst/>
           </a:prstGeom>
+          <a:ln w="12700"/>
         </p:spPr>
         <p:style>
           <a:lnRef idx="2">
@@ -4650,8 +4719,8 @@
         </p:nvSpPr>
         <p:spPr>
           <a:xfrm>
-            <a:off x="709082" y="6327596"/>
-            <a:ext cx="1255428" cy="264570"/>
+            <a:off x="709082" y="6168799"/>
+            <a:ext cx="1119722" cy="170953"/>
           </a:xfrm>
           <a:prstGeom prst="flowChartPunchedCard">
             <a:avLst/>
@@ -4662,6 +4731,7 @@
               <a:lumOff val="80000"/>
             </a:schemeClr>
           </a:solidFill>
+          <a:ln w="12700"/>
         </p:spPr>
         <p:style>
           <a:lnRef idx="2">
@@ -4698,12 +4768,13 @@
         </p:nvSpPr>
         <p:spPr>
           <a:xfrm>
-            <a:off x="709083" y="7534191"/>
-            <a:ext cx="1255428" cy="317518"/>
+            <a:off x="709083" y="7001811"/>
+            <a:ext cx="1119717" cy="185120"/>
           </a:xfrm>
           <a:prstGeom prst="flowChartProcess">
             <a:avLst/>
           </a:prstGeom>
+          <a:ln w="12700"/>
         </p:spPr>
         <p:style>
           <a:lnRef idx="2">
@@ -4740,12 +4811,13 @@
         </p:nvSpPr>
         <p:spPr>
           <a:xfrm>
-            <a:off x="709086" y="8169227"/>
-            <a:ext cx="1255428" cy="317518"/>
+            <a:off x="709079" y="7409069"/>
+            <a:ext cx="1119718" cy="200088"/>
           </a:xfrm>
           <a:prstGeom prst="flowChartProcess">
             <a:avLst/>
           </a:prstGeom>
+          <a:ln w="12700"/>
         </p:spPr>
         <p:style>
           <a:lnRef idx="2">
@@ -4785,15 +4857,15 @@
         </p:nvCxnSpPr>
         <p:spPr>
           <a:xfrm rot="10800000" flipV="1">
-            <a:off x="709083" y="4365375"/>
-            <a:ext cx="3" cy="2094505"/>
+            <a:off x="709083" y="4801220"/>
+            <a:ext cx="3" cy="1453056"/>
           </a:xfrm>
           <a:prstGeom prst="bentConnector3">
             <a:avLst>
               <a:gd name="adj1" fmla="val 7620100000"/>
             </a:avLst>
           </a:prstGeom>
-          <a:ln>
+          <a:ln w="12700">
             <a:tailEnd type="arrow"/>
           </a:ln>
         </p:spPr>
@@ -4823,15 +4895,15 @@
         </p:nvCxnSpPr>
         <p:spPr>
           <a:xfrm flipV="1">
-            <a:off x="1964514" y="5640235"/>
-            <a:ext cx="739350" cy="543486"/>
+            <a:off x="1828804" y="5411670"/>
+            <a:ext cx="875060" cy="646937"/>
           </a:xfrm>
           <a:prstGeom prst="bentConnector3">
             <a:avLst>
               <a:gd name="adj1" fmla="val 50000"/>
             </a:avLst>
           </a:prstGeom>
-          <a:ln>
+          <a:ln w="12700">
             <a:tailEnd type="arrow"/>
           </a:ln>
         </p:spPr>
@@ -4853,20 +4925,23 @@
       <p:cxnSp>
         <p:nvCxnSpPr>
           <p:cNvPr id="66" name="Elbow Connector 65"/>
-          <p:cNvCxnSpPr/>
+          <p:cNvCxnSpPr>
+            <a:stCxn id="38" idx="1"/>
+            <a:endCxn id="47" idx="1"/>
+          </p:cNvCxnSpPr>
           <p:nvPr/>
         </p:nvCxnSpPr>
         <p:spPr>
           <a:xfrm rot="10800000">
-            <a:off x="2716564" y="5904805"/>
-            <a:ext cx="12700" cy="1667824"/>
+            <a:off x="2703864" y="5639350"/>
+            <a:ext cx="25401" cy="1050342"/>
           </a:xfrm>
           <a:prstGeom prst="bentConnector3">
             <a:avLst>
-              <a:gd name="adj1" fmla="val 1800000"/>
+              <a:gd name="adj1" fmla="val 999965"/>
             </a:avLst>
           </a:prstGeom>
-          <a:ln>
+          <a:ln w="12700">
             <a:tailEnd type="arrow"/>
           </a:ln>
         </p:spPr>
@@ -4893,12 +4968,13 @@
         </p:nvSpPr>
         <p:spPr>
           <a:xfrm>
-            <a:off x="709089" y="8804263"/>
-            <a:ext cx="1255428" cy="317518"/>
+            <a:off x="709091" y="8097119"/>
+            <a:ext cx="1119715" cy="234081"/>
           </a:xfrm>
           <a:prstGeom prst="flowChartProcess">
             <a:avLst/>
           </a:prstGeom>
+          <a:ln w="12700"/>
         </p:spPr>
         <p:style>
           <a:lnRef idx="2">
@@ -4935,12 +5011,13 @@
         </p:nvSpPr>
         <p:spPr>
           <a:xfrm>
-            <a:off x="4850321" y="5299400"/>
-            <a:ext cx="1255428" cy="306601"/>
+            <a:off x="4926519" y="4940312"/>
+            <a:ext cx="1084812" cy="229027"/>
           </a:xfrm>
           <a:prstGeom prst="flowChartAlternateProcess">
             <a:avLst/>
           </a:prstGeom>
+          <a:ln w="12700"/>
         </p:spPr>
         <p:style>
           <a:lnRef idx="2">
@@ -4963,7 +5040,7 @@
             <a:pPr algn="ctr"/>
             <a:r>
               <a:rPr lang="en-US" sz="1200" b="1" dirty="0" err="1" smtClean="0"/>
-              <a:t>sysdef</a:t>
+              <a:t>sysdefs</a:t>
             </a:r>
             <a:endParaRPr lang="en-US" sz="1200" b="1" dirty="0"/>
           </a:p>
@@ -4977,8 +5054,8 @@
         </p:nvSpPr>
         <p:spPr>
           <a:xfrm>
-            <a:off x="4850319" y="5606397"/>
-            <a:ext cx="1255428" cy="287751"/>
+            <a:off x="4926520" y="5169339"/>
+            <a:ext cx="1084812" cy="237873"/>
           </a:xfrm>
           <a:prstGeom prst="flowChartPredefinedProcess">
             <a:avLst/>
@@ -4989,6 +5066,7 @@
               <a:lumOff val="80000"/>
             </a:schemeClr>
           </a:solidFill>
+          <a:ln w="12700"/>
         </p:spPr>
         <p:style>
           <a:lnRef idx="2">
@@ -5025,12 +5103,13 @@
         </p:nvSpPr>
         <p:spPr>
           <a:xfrm>
-            <a:off x="4850320" y="6494033"/>
-            <a:ext cx="1255428" cy="317518"/>
+            <a:off x="4926518" y="5895188"/>
+            <a:ext cx="1084812" cy="222724"/>
           </a:xfrm>
           <a:prstGeom prst="flowChartProcess">
             <a:avLst/>
           </a:prstGeom>
+          <a:ln w="12700"/>
         </p:spPr>
         <p:style>
           <a:lnRef idx="2">
@@ -5067,12 +5146,13 @@
         </p:nvSpPr>
         <p:spPr>
           <a:xfrm>
-            <a:off x="4850321" y="6168799"/>
-            <a:ext cx="1255428" cy="317518"/>
+            <a:off x="4926519" y="5663246"/>
+            <a:ext cx="1084812" cy="231942"/>
           </a:xfrm>
           <a:prstGeom prst="flowChartProcess">
             <a:avLst/>
           </a:prstGeom>
+          <a:ln w="12700"/>
         </p:spPr>
         <p:style>
           <a:lnRef idx="2">
@@ -5109,12 +5189,13 @@
         </p:nvSpPr>
         <p:spPr>
           <a:xfrm>
-            <a:off x="4850322" y="6811551"/>
-            <a:ext cx="1255428" cy="317518"/>
+            <a:off x="4926520" y="6117912"/>
+            <a:ext cx="1084812" cy="221108"/>
           </a:xfrm>
           <a:prstGeom prst="flowChartProcess">
             <a:avLst/>
           </a:prstGeom>
+          <a:ln w="12700"/>
         </p:spPr>
         <p:style>
           <a:lnRef idx="2">
@@ -5151,12 +5232,13 @@
         </p:nvSpPr>
         <p:spPr>
           <a:xfrm>
-            <a:off x="4850321" y="8176791"/>
-            <a:ext cx="1255428" cy="306601"/>
+            <a:off x="4926518" y="6808065"/>
+            <a:ext cx="1136884" cy="252104"/>
           </a:xfrm>
           <a:prstGeom prst="flowChartAlternateProcess">
             <a:avLst/>
           </a:prstGeom>
+          <a:ln w="12700"/>
         </p:spPr>
         <p:style>
           <a:lnRef idx="2">
@@ -5193,8 +5275,8 @@
         </p:nvSpPr>
         <p:spPr>
           <a:xfrm>
-            <a:off x="4850321" y="8483392"/>
-            <a:ext cx="1255428" cy="264570"/>
+            <a:off x="4926518" y="7066098"/>
+            <a:ext cx="1136884" cy="203408"/>
           </a:xfrm>
           <a:prstGeom prst="flowChartPunchedCard">
             <a:avLst/>
@@ -5205,6 +5287,7 @@
               <a:lumOff val="80000"/>
             </a:schemeClr>
           </a:solidFill>
+          <a:ln w="12700"/>
         </p:spPr>
         <p:style>
           <a:lnRef idx="2">
@@ -5241,8 +5324,8 @@
         </p:nvSpPr>
         <p:spPr>
           <a:xfrm>
-            <a:off x="4850321" y="8747962"/>
-            <a:ext cx="1255428" cy="264570"/>
+            <a:off x="4926518" y="7269506"/>
+            <a:ext cx="1136884" cy="201305"/>
           </a:xfrm>
           <a:prstGeom prst="flowChartPunchedCard">
             <a:avLst/>
@@ -5253,6 +5336,7 @@
               <a:lumOff val="80000"/>
             </a:schemeClr>
           </a:solidFill>
+          <a:ln w="12700"/>
         </p:spPr>
         <p:style>
           <a:lnRef idx="2">
@@ -5292,8 +5376,8 @@
         </p:nvCxnSpPr>
         <p:spPr>
           <a:xfrm>
-            <a:off x="3971993" y="7200231"/>
-            <a:ext cx="878328" cy="1680016"/>
+            <a:off x="3877733" y="6689692"/>
+            <a:ext cx="1048785" cy="680467"/>
           </a:xfrm>
           <a:prstGeom prst="bentConnector3">
             <a:avLst>
@@ -5329,16 +5413,16 @@
           <p:nvPr/>
         </p:nvCxnSpPr>
         <p:spPr>
-          <a:xfrm rot="10800000" flipH="1" flipV="1">
-            <a:off x="4850319" y="5750273"/>
-            <a:ext cx="2" cy="2865404"/>
+          <a:xfrm rot="10800000" flipV="1">
+            <a:off x="4926518" y="5288276"/>
+            <a:ext cx="2" cy="1879526"/>
           </a:xfrm>
           <a:prstGeom prst="bentConnector3">
             <a:avLst>
-              <a:gd name="adj1" fmla="val -11430000000"/>
+              <a:gd name="adj1" fmla="val 11430100000"/>
             </a:avLst>
           </a:prstGeom>
-          <a:ln>
+          <a:ln w="12700">
             <a:tailEnd type="arrow"/>
           </a:ln>
         </p:spPr>
@@ -5365,12 +5449,13 @@
         </p:nvSpPr>
         <p:spPr>
           <a:xfrm>
-            <a:off x="709089" y="7851709"/>
-            <a:ext cx="1255428" cy="317518"/>
+            <a:off x="709091" y="7192688"/>
+            <a:ext cx="1119715" cy="216013"/>
           </a:xfrm>
           <a:prstGeom prst="flowChartProcess">
             <a:avLst/>
           </a:prstGeom>
+          <a:ln w="12700"/>
         </p:spPr>
         <p:style>
           <a:lnRef idx="2">
@@ -5407,12 +5492,13 @@
         </p:nvSpPr>
         <p:spPr>
           <a:xfrm>
-            <a:off x="4850313" y="3401022"/>
-            <a:ext cx="1255428" cy="306601"/>
+            <a:off x="4850313" y="3534572"/>
+            <a:ext cx="1161022" cy="225919"/>
           </a:xfrm>
           <a:prstGeom prst="flowChartAlternateProcess">
             <a:avLst/>
           </a:prstGeom>
+          <a:ln w="12700"/>
         </p:spPr>
         <p:style>
           <a:lnRef idx="2">
@@ -5449,8 +5535,8 @@
         </p:nvSpPr>
         <p:spPr>
           <a:xfrm>
-            <a:off x="4850311" y="3707623"/>
-            <a:ext cx="1255428" cy="264570"/>
+            <a:off x="4850311" y="3760491"/>
+            <a:ext cx="1161022" cy="194916"/>
           </a:xfrm>
           <a:prstGeom prst="flowChartPunchedCard">
             <a:avLst/>
@@ -5461,6 +5547,7 @@
               <a:lumOff val="40000"/>
             </a:schemeClr>
           </a:solidFill>
+          <a:ln w="12700"/>
         </p:spPr>
         <p:style>
           <a:lnRef idx="2">
@@ -5497,8 +5584,8 @@
         </p:nvSpPr>
         <p:spPr>
           <a:xfrm>
-            <a:off x="4850311" y="3972193"/>
-            <a:ext cx="1255428" cy="264570"/>
+            <a:off x="4850311" y="3950444"/>
+            <a:ext cx="1161022" cy="221199"/>
           </a:xfrm>
           <a:prstGeom prst="flowChartPunchedCard">
             <a:avLst/>
@@ -5509,6 +5596,7 @@
               <a:lumOff val="80000"/>
             </a:schemeClr>
           </a:solidFill>
+          <a:ln w="12700"/>
         </p:spPr>
         <p:style>
           <a:lnRef idx="2">
@@ -5545,12 +5633,13 @@
         </p:nvSpPr>
         <p:spPr>
           <a:xfrm>
-            <a:off x="4850311" y="4236763"/>
-            <a:ext cx="1255428" cy="317518"/>
+            <a:off x="4850311" y="4171643"/>
+            <a:ext cx="1161022" cy="240186"/>
           </a:xfrm>
           <a:prstGeom prst="flowChartProcess">
             <a:avLst/>
           </a:prstGeom>
+          <a:ln w="12700"/>
         </p:spPr>
         <p:style>
           <a:lnRef idx="2">
@@ -5587,8 +5676,8 @@
         </p:nvSpPr>
         <p:spPr>
           <a:xfrm>
-            <a:off x="2703864" y="444271"/>
-            <a:ext cx="1255428" cy="306601"/>
+            <a:off x="709098" y="600102"/>
+            <a:ext cx="1097670" cy="251084"/>
           </a:xfrm>
           <a:prstGeom prst="flowChartAlternateProcess">
             <a:avLst/>
@@ -5629,12 +5718,13 @@
         </p:nvSpPr>
         <p:spPr>
           <a:xfrm>
-            <a:off x="7004416" y="3725929"/>
-            <a:ext cx="1255428" cy="306601"/>
+            <a:off x="7004428" y="2991781"/>
+            <a:ext cx="1123580" cy="230898"/>
           </a:xfrm>
           <a:prstGeom prst="flowChartAlternateProcess">
             <a:avLst/>
           </a:prstGeom>
+          <a:ln w="12700"/>
         </p:spPr>
         <p:style>
           <a:lnRef idx="2">
@@ -5657,7 +5747,7 @@
             <a:pPr algn="ctr"/>
             <a:r>
               <a:rPr lang="en-US" sz="1200" b="1" dirty="0" smtClean="0"/>
-              <a:t>system</a:t>
+              <a:t>systems</a:t>
             </a:r>
             <a:endParaRPr lang="en-US" sz="1200" b="1" dirty="0"/>
           </a:p>
@@ -5671,8 +5761,8 @@
         </p:nvSpPr>
         <p:spPr>
           <a:xfrm>
-            <a:off x="7004416" y="4027619"/>
-            <a:ext cx="1255428" cy="287751"/>
+            <a:off x="7004428" y="3228631"/>
+            <a:ext cx="1123580" cy="220061"/>
           </a:xfrm>
           <a:prstGeom prst="flowChartPredefinedProcess">
             <a:avLst/>
@@ -5683,6 +5773,7 @@
               <a:lumOff val="40000"/>
             </a:schemeClr>
           </a:solidFill>
+          <a:ln w="12700"/>
         </p:spPr>
         <p:style>
           <a:lnRef idx="2">
@@ -5719,12 +5810,13 @@
         </p:nvSpPr>
         <p:spPr>
           <a:xfrm>
-            <a:off x="7004413" y="8113996"/>
-            <a:ext cx="1255428" cy="317518"/>
+            <a:off x="7080614" y="8150739"/>
+            <a:ext cx="1123604" cy="196468"/>
           </a:xfrm>
           <a:prstGeom prst="flowChartProcess">
             <a:avLst/>
           </a:prstGeom>
+          <a:ln w="12700"/>
         </p:spPr>
         <p:style>
           <a:lnRef idx="2">
@@ -5761,12 +5853,13 @@
         </p:nvSpPr>
         <p:spPr>
           <a:xfrm>
-            <a:off x="7004418" y="4573743"/>
-            <a:ext cx="1255428" cy="317518"/>
+            <a:off x="7004425" y="3677680"/>
+            <a:ext cx="1123580" cy="274737"/>
           </a:xfrm>
           <a:prstGeom prst="flowChartProcess">
             <a:avLst/>
           </a:prstGeom>
+          <a:ln w="12700"/>
         </p:spPr>
         <p:style>
           <a:lnRef idx="2">
@@ -5803,12 +5896,13 @@
         </p:nvSpPr>
         <p:spPr>
           <a:xfrm>
-            <a:off x="7004418" y="4888902"/>
-            <a:ext cx="1255428" cy="317518"/>
+            <a:off x="7004430" y="3952417"/>
+            <a:ext cx="1123580" cy="220586"/>
           </a:xfrm>
           <a:prstGeom prst="flowChartProcess">
             <a:avLst/>
           </a:prstGeom>
+          <a:ln w="12700"/>
         </p:spPr>
         <p:style>
           <a:lnRef idx="2">
@@ -5845,8 +5939,8 @@
         </p:nvSpPr>
         <p:spPr>
           <a:xfrm>
-            <a:off x="7004416" y="4315370"/>
-            <a:ext cx="1255428" cy="264570"/>
+            <a:off x="7004425" y="3448936"/>
+            <a:ext cx="1123580" cy="228744"/>
           </a:xfrm>
           <a:prstGeom prst="flowChartPunchedCard">
             <a:avLst/>
@@ -5857,6 +5951,7 @@
               <a:lumOff val="80000"/>
             </a:schemeClr>
           </a:solidFill>
+          <a:ln w="12700"/>
         </p:spPr>
         <p:style>
           <a:lnRef idx="2">
@@ -5896,15 +5991,15 @@
         </p:nvCxnSpPr>
         <p:spPr>
           <a:xfrm flipV="1">
-            <a:off x="6105747" y="4447655"/>
-            <a:ext cx="898669" cy="1302618"/>
+            <a:off x="6011332" y="3563308"/>
+            <a:ext cx="993093" cy="1724968"/>
           </a:xfrm>
           <a:prstGeom prst="bentConnector3">
             <a:avLst>
               <a:gd name="adj1" fmla="val 50000"/>
             </a:avLst>
           </a:prstGeom>
-          <a:ln>
+          <a:ln w="12700">
             <a:tailEnd type="arrow"/>
           </a:ln>
         </p:spPr>
@@ -5933,16 +6028,16 @@
           <p:nvPr/>
         </p:nvCxnSpPr>
         <p:spPr>
-          <a:xfrm rot="10800000">
-            <a:off x="6105740" y="3839909"/>
-            <a:ext cx="898677" cy="331587"/>
+          <a:xfrm rot="10800000" flipV="1">
+            <a:off x="6011334" y="3338661"/>
+            <a:ext cx="993095" cy="519287"/>
           </a:xfrm>
           <a:prstGeom prst="bentConnector3">
             <a:avLst>
               <a:gd name="adj1" fmla="val 50000"/>
             </a:avLst>
           </a:prstGeom>
-          <a:ln>
+          <a:ln w="12700">
             <a:tailEnd type="arrow"/>
           </a:ln>
         </p:spPr>
@@ -5969,12 +6064,13 @@
         </p:nvSpPr>
         <p:spPr>
           <a:xfrm>
-            <a:off x="7004418" y="5206420"/>
-            <a:ext cx="1255428" cy="317518"/>
+            <a:off x="7004437" y="4173004"/>
+            <a:ext cx="1123580" cy="238826"/>
           </a:xfrm>
           <a:prstGeom prst="flowChartProcess">
             <a:avLst/>
           </a:prstGeom>
+          <a:ln w="12700"/>
         </p:spPr>
         <p:style>
           <a:lnRef idx="2">
@@ -6010,12 +6106,13 @@
         </p:nvSpPr>
         <p:spPr>
           <a:xfrm>
-            <a:off x="7004418" y="5526753"/>
-            <a:ext cx="1255428" cy="317518"/>
+            <a:off x="7004430" y="4418425"/>
+            <a:ext cx="1123580" cy="242331"/>
           </a:xfrm>
           <a:prstGeom prst="flowChartProcess">
             <a:avLst/>
           </a:prstGeom>
+          <a:ln w="12700"/>
         </p:spPr>
         <p:style>
           <a:lnRef idx="2">
@@ -6052,12 +6149,13 @@
         </p:nvSpPr>
         <p:spPr>
           <a:xfrm>
-            <a:off x="7004413" y="6698108"/>
-            <a:ext cx="1255428" cy="306601"/>
+            <a:off x="7080614" y="7022962"/>
+            <a:ext cx="1123604" cy="206645"/>
           </a:xfrm>
           <a:prstGeom prst="flowChartAlternateProcess">
             <a:avLst/>
           </a:prstGeom>
+          <a:ln w="12700"/>
         </p:spPr>
         <p:style>
           <a:lnRef idx="2">
@@ -6094,8 +6192,8 @@
         </p:nvSpPr>
         <p:spPr>
           <a:xfrm>
-            <a:off x="7004413" y="7317179"/>
-            <a:ext cx="1255428" cy="264570"/>
+            <a:off x="7080614" y="7492769"/>
+            <a:ext cx="1123604" cy="189730"/>
           </a:xfrm>
           <a:prstGeom prst="flowChartPunchedCard">
             <a:avLst/>
@@ -6106,6 +6204,7 @@
               <a:lumOff val="40000"/>
             </a:schemeClr>
           </a:solidFill>
+          <a:ln w="12700"/>
         </p:spPr>
         <p:style>
           <a:lnRef idx="2">
@@ -6142,8 +6241,8 @@
         </p:nvSpPr>
         <p:spPr>
           <a:xfrm>
-            <a:off x="7004413" y="7850200"/>
-            <a:ext cx="1255428" cy="264570"/>
+            <a:off x="7080613" y="7896126"/>
+            <a:ext cx="1123604" cy="246049"/>
           </a:xfrm>
           <a:prstGeom prst="flowChartPunchedCard">
             <a:avLst/>
@@ -6154,6 +6253,7 @@
               <a:lumOff val="80000"/>
             </a:schemeClr>
           </a:solidFill>
+          <a:ln w="12700"/>
         </p:spPr>
         <p:style>
           <a:lnRef idx="2">
@@ -6190,12 +6290,13 @@
         </p:nvSpPr>
         <p:spPr>
           <a:xfrm>
-            <a:off x="7004413" y="8428895"/>
-            <a:ext cx="1255428" cy="317518"/>
+            <a:off x="7080614" y="8361174"/>
+            <a:ext cx="1123604" cy="227217"/>
           </a:xfrm>
           <a:prstGeom prst="flowChartProcess">
             <a:avLst/>
           </a:prstGeom>
+          <a:ln w="12700"/>
         </p:spPr>
         <p:style>
           <a:lnRef idx="2">
@@ -6232,8 +6333,8 @@
         </p:nvSpPr>
         <p:spPr>
           <a:xfrm>
-            <a:off x="7004413" y="7585630"/>
-            <a:ext cx="1255428" cy="264570"/>
+            <a:off x="7080614" y="7683106"/>
+            <a:ext cx="1123604" cy="213020"/>
           </a:xfrm>
           <a:prstGeom prst="flowChartPunchedCard">
             <a:avLst/>
@@ -6244,6 +6345,7 @@
               <a:lumOff val="80000"/>
             </a:schemeClr>
           </a:solidFill>
+          <a:ln w="12700"/>
         </p:spPr>
         <p:style>
           <a:lnRef idx="2">
@@ -6280,12 +6382,13 @@
         </p:nvSpPr>
         <p:spPr>
           <a:xfrm>
-            <a:off x="7004418" y="5851006"/>
-            <a:ext cx="1255428" cy="317518"/>
+            <a:off x="7004437" y="4673301"/>
+            <a:ext cx="1123580" cy="229873"/>
           </a:xfrm>
           <a:prstGeom prst="flowChartProcess">
             <a:avLst/>
           </a:prstGeom>
+          <a:ln w="12700"/>
         </p:spPr>
         <p:style>
           <a:lnRef idx="2">
@@ -6324,16 +6427,16 @@
           <p:nvPr/>
         </p:nvCxnSpPr>
         <p:spPr>
-          <a:xfrm rot="10800000" flipV="1">
-            <a:off x="7004414" y="4171494"/>
-            <a:ext cx="3" cy="3277969"/>
+          <a:xfrm rot="10800000" flipH="1" flipV="1">
+            <a:off x="7004428" y="3338662"/>
+            <a:ext cx="76186" cy="4248972"/>
           </a:xfrm>
           <a:prstGeom prst="bentConnector3">
             <a:avLst>
-              <a:gd name="adj1" fmla="val 7620100000"/>
+              <a:gd name="adj1" fmla="val -300055"/>
             </a:avLst>
           </a:prstGeom>
-          <a:ln>
+          <a:ln w="12700">
             <a:tailEnd type="arrow"/>
           </a:ln>
         </p:spPr>
@@ -6363,12 +6466,12 @@
         </p:nvCxnSpPr>
         <p:spPr>
           <a:xfrm>
-            <a:off x="3971993" y="7200231"/>
-            <a:ext cx="3032420" cy="782254"/>
+            <a:off x="3877733" y="6689692"/>
+            <a:ext cx="3202880" cy="1329459"/>
           </a:xfrm>
           <a:prstGeom prst="bentConnector3">
             <a:avLst>
-              <a:gd name="adj1" fmla="val 50000"/>
+              <a:gd name="adj1" fmla="val 73262"/>
             </a:avLst>
           </a:prstGeom>
           <a:ln>
@@ -6398,12 +6501,13 @@
         </p:nvSpPr>
         <p:spPr>
           <a:xfrm>
-            <a:off x="7004413" y="7022713"/>
-            <a:ext cx="1255428" cy="287751"/>
+            <a:off x="7080613" y="7234563"/>
+            <a:ext cx="1123604" cy="245580"/>
           </a:xfrm>
           <a:prstGeom prst="flowChartPredefinedProcess">
             <a:avLst/>
           </a:prstGeom>
+          <a:ln w="12700"/>
         </p:spPr>
         <p:style>
           <a:lnRef idx="2">
@@ -6443,12 +6547,12 @@
         </p:nvCxnSpPr>
         <p:spPr>
           <a:xfrm>
-            <a:off x="1964514" y="6183721"/>
-            <a:ext cx="5039899" cy="1534194"/>
+            <a:off x="1828804" y="6058607"/>
+            <a:ext cx="5251810" cy="1731009"/>
           </a:xfrm>
           <a:prstGeom prst="bentConnector3">
             <a:avLst>
-              <a:gd name="adj1" fmla="val 45564"/>
+              <a:gd name="adj1" fmla="val 50000"/>
             </a:avLst>
           </a:prstGeom>
           <a:ln>
@@ -6478,12 +6582,13 @@
         </p:nvSpPr>
         <p:spPr>
           <a:xfrm>
-            <a:off x="10932665" y="440578"/>
-            <a:ext cx="1255428" cy="306601"/>
+            <a:off x="8982647" y="851186"/>
+            <a:ext cx="1101233" cy="211122"/>
           </a:xfrm>
           <a:prstGeom prst="flowChartAlternateProcess">
             <a:avLst/>
           </a:prstGeom>
+          <a:ln w="12700"/>
         </p:spPr>
         <p:style>
           <a:lnRef idx="2">
@@ -6506,7 +6611,7 @@
             <a:pPr algn="ctr"/>
             <a:r>
               <a:rPr lang="en-US" sz="1200" b="1" dirty="0" err="1" smtClean="0"/>
-              <a:t>expdataset</a:t>
+              <a:t>expdatasets</a:t>
             </a:r>
             <a:endParaRPr lang="en-US" sz="1200" b="1" dirty="0"/>
           </a:p>
@@ -6520,8 +6625,8 @@
         </p:nvSpPr>
         <p:spPr>
           <a:xfrm>
-            <a:off x="10932664" y="750872"/>
-            <a:ext cx="1255428" cy="287751"/>
+            <a:off x="8982646" y="1071750"/>
+            <a:ext cx="1101233" cy="198142"/>
           </a:xfrm>
           <a:prstGeom prst="flowChartPredefinedProcess">
             <a:avLst/>
@@ -6531,6 +6636,7 @@
               <a:lumMod val="90000"/>
             </a:schemeClr>
           </a:solidFill>
+          <a:ln w="12700"/>
         </p:spPr>
         <p:style>
           <a:lnRef idx="2">
@@ -6567,12 +6673,13 @@
         </p:nvSpPr>
         <p:spPr>
           <a:xfrm>
-            <a:off x="10932671" y="1611246"/>
-            <a:ext cx="1255428" cy="317518"/>
+            <a:off x="8982653" y="1687037"/>
+            <a:ext cx="1101233" cy="218639"/>
           </a:xfrm>
           <a:prstGeom prst="flowChartProcess">
             <a:avLst/>
           </a:prstGeom>
+          <a:ln w="12700"/>
         </p:spPr>
         <p:style>
           <a:lnRef idx="2">
@@ -6609,12 +6716,13 @@
         </p:nvSpPr>
         <p:spPr>
           <a:xfrm>
-            <a:off x="10932671" y="1293728"/>
-            <a:ext cx="1255428" cy="317518"/>
+            <a:off x="8982653" y="1469440"/>
+            <a:ext cx="1101233" cy="218639"/>
           </a:xfrm>
           <a:prstGeom prst="flowChartProcess">
             <a:avLst/>
           </a:prstGeom>
+          <a:ln w="12700"/>
         </p:spPr>
         <p:style>
           <a:lnRef idx="2">
@@ -6651,12 +6759,13 @@
         </p:nvSpPr>
         <p:spPr>
           <a:xfrm>
-            <a:off x="10932671" y="1928764"/>
-            <a:ext cx="1255428" cy="317518"/>
+            <a:off x="8982653" y="1913579"/>
+            <a:ext cx="1101233" cy="218639"/>
           </a:xfrm>
           <a:prstGeom prst="flowChartProcess">
             <a:avLst/>
           </a:prstGeom>
+          <a:ln w="12700"/>
         </p:spPr>
         <p:style>
           <a:lnRef idx="2">
@@ -6693,12 +6802,13 @@
         </p:nvSpPr>
         <p:spPr>
           <a:xfrm>
-            <a:off x="10932671" y="2239923"/>
-            <a:ext cx="1255428" cy="317518"/>
+            <a:off x="8982677" y="2137652"/>
+            <a:ext cx="1101233" cy="218639"/>
           </a:xfrm>
           <a:prstGeom prst="flowChartProcess">
             <a:avLst/>
           </a:prstGeom>
+          <a:ln w="12700"/>
         </p:spPr>
         <p:style>
           <a:lnRef idx="2">
@@ -6735,12 +6845,13 @@
         </p:nvSpPr>
         <p:spPr>
           <a:xfrm>
-            <a:off x="10932671" y="2557441"/>
-            <a:ext cx="1255428" cy="317518"/>
+            <a:off x="8982677" y="2356198"/>
+            <a:ext cx="1101233" cy="218639"/>
           </a:xfrm>
           <a:prstGeom prst="flowChartProcess">
             <a:avLst/>
           </a:prstGeom>
+          <a:ln w="12700"/>
         </p:spPr>
         <p:style>
           <a:lnRef idx="2">
@@ -6777,12 +6888,13 @@
         </p:nvSpPr>
         <p:spPr>
           <a:xfrm>
-            <a:off x="10932671" y="2874959"/>
-            <a:ext cx="1255428" cy="317518"/>
+            <a:off x="8982677" y="2580649"/>
+            <a:ext cx="1101233" cy="218639"/>
           </a:xfrm>
           <a:prstGeom prst="flowChartProcess">
             <a:avLst/>
           </a:prstGeom>
+          <a:ln w="12700"/>
         </p:spPr>
         <p:style>
           <a:lnRef idx="2">
@@ -6819,12 +6931,13 @@
         </p:nvSpPr>
         <p:spPr>
           <a:xfrm>
-            <a:off x="10932664" y="3201942"/>
-            <a:ext cx="1255428" cy="317518"/>
+            <a:off x="8982677" y="2799288"/>
+            <a:ext cx="1101233" cy="218639"/>
           </a:xfrm>
           <a:prstGeom prst="flowChartProcess">
             <a:avLst/>
           </a:prstGeom>
+          <a:ln w="12700"/>
         </p:spPr>
         <p:style>
           <a:lnRef idx="2">
@@ -6861,12 +6974,13 @@
         </p:nvSpPr>
         <p:spPr>
           <a:xfrm>
-            <a:off x="10932664" y="3511237"/>
-            <a:ext cx="1255428" cy="317518"/>
+            <a:off x="8982646" y="3017927"/>
+            <a:ext cx="1101233" cy="218639"/>
           </a:xfrm>
           <a:prstGeom prst="flowChartProcess">
             <a:avLst/>
           </a:prstGeom>
+          <a:ln w="12700"/>
         </p:spPr>
         <p:style>
           <a:lnRef idx="2">
@@ -6903,8 +7017,8 @@
         </p:nvSpPr>
         <p:spPr>
           <a:xfrm>
-            <a:off x="4850319" y="5894148"/>
-            <a:ext cx="1255428" cy="264570"/>
+            <a:off x="4926521" y="5407212"/>
+            <a:ext cx="1084812" cy="255934"/>
           </a:xfrm>
           <a:prstGeom prst="flowChartPunchedCard">
             <a:avLst/>
@@ -6914,6 +7028,7 @@
               <a:lumMod val="90000"/>
             </a:schemeClr>
           </a:solidFill>
+          <a:ln w="12700"/>
         </p:spPr>
         <p:style>
           <a:lnRef idx="2">
@@ -6942,44 +7057,6 @@
           </a:p>
         </p:txBody>
       </p:sp>
-      <p:cxnSp>
-        <p:nvCxnSpPr>
-          <p:cNvPr id="216" name="Elbow Connector 215"/>
-          <p:cNvCxnSpPr>
-            <a:stCxn id="205" idx="1"/>
-            <a:endCxn id="215" idx="3"/>
-          </p:cNvCxnSpPr>
-          <p:nvPr/>
-        </p:nvCxnSpPr>
-        <p:spPr>
-          <a:xfrm rot="10800000" flipV="1">
-            <a:off x="6105748" y="894747"/>
-            <a:ext cx="4826917" cy="5131685"/>
-          </a:xfrm>
-          <a:prstGeom prst="bentConnector3">
-            <a:avLst>
-              <a:gd name="adj1" fmla="val 50000"/>
-            </a:avLst>
-          </a:prstGeom>
-          <a:ln>
-            <a:tailEnd type="arrow"/>
-          </a:ln>
-        </p:spPr>
-        <p:style>
-          <a:lnRef idx="1">
-            <a:schemeClr val="dk1"/>
-          </a:lnRef>
-          <a:fillRef idx="0">
-            <a:schemeClr val="dk1"/>
-          </a:fillRef>
-          <a:effectRef idx="0">
-            <a:schemeClr val="dk1"/>
-          </a:effectRef>
-          <a:fontRef idx="minor">
-            <a:schemeClr val="tx1"/>
-          </a:fontRef>
-        </p:style>
-      </p:cxnSp>
       <p:sp>
         <p:nvSpPr>
           <p:cNvPr id="227" name="Alternate Process 226"/>
@@ -6988,12 +7065,13 @@
         </p:nvSpPr>
         <p:spPr>
           <a:xfrm>
-            <a:off x="8982613" y="4032530"/>
-            <a:ext cx="1255428" cy="306601"/>
+            <a:off x="8982646" y="4903174"/>
+            <a:ext cx="1101209" cy="224064"/>
           </a:xfrm>
           <a:prstGeom prst="flowChartAlternateProcess">
             <a:avLst/>
           </a:prstGeom>
+          <a:ln w="12700"/>
         </p:spPr>
         <p:style>
           <a:lnRef idx="2">
@@ -7030,8 +7108,8 @@
         </p:nvSpPr>
         <p:spPr>
           <a:xfrm>
-            <a:off x="8982611" y="4339131"/>
-            <a:ext cx="1255428" cy="264570"/>
+            <a:off x="8982644" y="5127238"/>
+            <a:ext cx="1101209" cy="193348"/>
           </a:xfrm>
           <a:prstGeom prst="flowChartPunchedCard">
             <a:avLst/>
@@ -7042,6 +7120,7 @@
               <a:lumOff val="40000"/>
             </a:schemeClr>
           </a:solidFill>
+          <a:ln w="12700"/>
         </p:spPr>
         <p:style>
           <a:lnRef idx="2">
@@ -7082,8 +7161,8 @@
         </p:nvSpPr>
         <p:spPr>
           <a:xfrm>
-            <a:off x="8982611" y="4603701"/>
-            <a:ext cx="1255428" cy="264570"/>
+            <a:off x="8982633" y="5330677"/>
+            <a:ext cx="1101209" cy="193348"/>
           </a:xfrm>
           <a:prstGeom prst="flowChartPunchedCard">
             <a:avLst/>
@@ -7094,6 +7173,7 @@
               <a:lumOff val="80000"/>
             </a:schemeClr>
           </a:solidFill>
+          <a:ln w="12700"/>
         </p:spPr>
         <p:style>
           <a:lnRef idx="2">
@@ -7130,12 +7210,13 @@
         </p:nvSpPr>
         <p:spPr>
           <a:xfrm>
-            <a:off x="8982611" y="4868271"/>
-            <a:ext cx="1255428" cy="317518"/>
+            <a:off x="8982633" y="5524025"/>
+            <a:ext cx="1101209" cy="232042"/>
           </a:xfrm>
           <a:prstGeom prst="flowChartProcess">
             <a:avLst/>
           </a:prstGeom>
+          <a:ln w="12700"/>
         </p:spPr>
         <p:style>
           <a:lnRef idx="2">
@@ -7172,12 +7253,13 @@
         </p:nvSpPr>
         <p:spPr>
           <a:xfrm>
-            <a:off x="8982611" y="5180299"/>
-            <a:ext cx="1255428" cy="317518"/>
+            <a:off x="8982644" y="5755273"/>
+            <a:ext cx="1101209" cy="232042"/>
           </a:xfrm>
           <a:prstGeom prst="flowChartProcess">
             <a:avLst/>
           </a:prstGeom>
+          <a:ln w="12700"/>
         </p:spPr>
         <p:style>
           <a:lnRef idx="2">
@@ -7214,12 +7296,13 @@
         </p:nvSpPr>
         <p:spPr>
           <a:xfrm>
-            <a:off x="8982613" y="5497817"/>
-            <a:ext cx="1255428" cy="317518"/>
+            <a:off x="8982633" y="5987315"/>
+            <a:ext cx="1101209" cy="232042"/>
           </a:xfrm>
           <a:prstGeom prst="flowChartProcess">
             <a:avLst/>
           </a:prstGeom>
+          <a:ln w="12700"/>
         </p:spPr>
         <p:style>
           <a:lnRef idx="2">
@@ -7256,12 +7339,13 @@
         </p:nvSpPr>
         <p:spPr>
           <a:xfrm>
-            <a:off x="8982611" y="5807084"/>
-            <a:ext cx="1255428" cy="317518"/>
+            <a:off x="8982644" y="6221575"/>
+            <a:ext cx="1101209" cy="232042"/>
           </a:xfrm>
           <a:prstGeom prst="flowChartProcess">
             <a:avLst/>
           </a:prstGeom>
+          <a:ln w="12700"/>
         </p:spPr>
         <p:style>
           <a:lnRef idx="2">
@@ -7298,12 +7382,13 @@
         </p:nvSpPr>
         <p:spPr>
           <a:xfrm>
-            <a:off x="8982611" y="6735047"/>
-            <a:ext cx="1255428" cy="306601"/>
+            <a:off x="8982622" y="7048296"/>
+            <a:ext cx="1101189" cy="234298"/>
           </a:xfrm>
           <a:prstGeom prst="flowChartAlternateProcess">
             <a:avLst/>
           </a:prstGeom>
+          <a:ln w="12700"/>
         </p:spPr>
         <p:style>
           <a:lnRef idx="2">
@@ -7340,12 +7425,13 @@
         </p:nvSpPr>
         <p:spPr>
           <a:xfrm>
-            <a:off x="8982611" y="8449996"/>
-            <a:ext cx="1255428" cy="317518"/>
+            <a:off x="8982633" y="8348115"/>
+            <a:ext cx="1101189" cy="242641"/>
           </a:xfrm>
           <a:prstGeom prst="flowChartProcess">
             <a:avLst/>
           </a:prstGeom>
+          <a:ln w="12700"/>
         </p:spPr>
         <p:style>
           <a:lnRef idx="2">
@@ -7382,12 +7468,13 @@
         </p:nvSpPr>
         <p:spPr>
           <a:xfrm>
-            <a:off x="8982611" y="7829835"/>
-            <a:ext cx="1255428" cy="317518"/>
+            <a:off x="8982622" y="7879975"/>
+            <a:ext cx="1101189" cy="242641"/>
           </a:xfrm>
           <a:prstGeom prst="flowChartProcess">
             <a:avLst/>
           </a:prstGeom>
+          <a:ln w="12700"/>
         </p:spPr>
         <p:style>
           <a:lnRef idx="2">
@@ -7424,12 +7511,13 @@
         </p:nvSpPr>
         <p:spPr>
           <a:xfrm>
-            <a:off x="8982611" y="8147353"/>
-            <a:ext cx="1255428" cy="317518"/>
+            <a:off x="8982622" y="8113394"/>
+            <a:ext cx="1101189" cy="242641"/>
           </a:xfrm>
           <a:prstGeom prst="flowChartProcess">
             <a:avLst/>
           </a:prstGeom>
+          <a:ln w="12700"/>
         </p:spPr>
         <p:style>
           <a:lnRef idx="2">
@@ -7466,8 +7554,8 @@
         </p:nvSpPr>
         <p:spPr>
           <a:xfrm>
-            <a:off x="8982611" y="7300695"/>
-            <a:ext cx="1255428" cy="264570"/>
+            <a:off x="8982622" y="7487453"/>
+            <a:ext cx="1101189" cy="202179"/>
           </a:xfrm>
           <a:prstGeom prst="flowChartPunchedCard">
             <a:avLst/>
@@ -7478,6 +7566,7 @@
               <a:lumOff val="80000"/>
             </a:schemeClr>
           </a:solidFill>
+          <a:ln w="12700"/>
         </p:spPr>
         <p:style>
           <a:lnRef idx="2">
@@ -7514,8 +7603,8 @@
         </p:nvSpPr>
         <p:spPr>
           <a:xfrm>
-            <a:off x="8982611" y="7565265"/>
-            <a:ext cx="1255428" cy="264570"/>
+            <a:off x="8982622" y="7684014"/>
+            <a:ext cx="1101189" cy="202179"/>
           </a:xfrm>
           <a:prstGeom prst="flowChartPunchedCard">
             <a:avLst/>
@@ -7526,6 +7615,7 @@
               <a:lumOff val="80000"/>
             </a:schemeClr>
           </a:solidFill>
+          <a:ln w="12700"/>
         </p:spPr>
         <p:style>
           <a:lnRef idx="2">
@@ -7562,8 +7652,8 @@
         </p:nvSpPr>
         <p:spPr>
           <a:xfrm>
-            <a:off x="8982611" y="7036125"/>
-            <a:ext cx="1255428" cy="264570"/>
+            <a:off x="8982622" y="7289858"/>
+            <a:ext cx="1101189" cy="202179"/>
           </a:xfrm>
           <a:prstGeom prst="flowChartPunchedCard">
             <a:avLst/>
@@ -7574,6 +7664,7 @@
               <a:lumOff val="40000"/>
             </a:schemeClr>
           </a:solidFill>
+          <a:ln w="12700"/>
         </p:spPr>
         <p:style>
           <a:lnRef idx="2">
@@ -7610,12 +7701,13 @@
         </p:nvSpPr>
         <p:spPr>
           <a:xfrm>
-            <a:off x="10932659" y="4247680"/>
-            <a:ext cx="1255428" cy="306601"/>
+            <a:off x="10932662" y="4891756"/>
+            <a:ext cx="1123871" cy="224064"/>
           </a:xfrm>
           <a:prstGeom prst="flowChartAlternateProcess">
             <a:avLst/>
           </a:prstGeom>
+          <a:ln w="12700"/>
         </p:spPr>
         <p:style>
           <a:lnRef idx="2">
@@ -7656,8 +7748,8 @@
         </p:nvSpPr>
         <p:spPr>
           <a:xfrm>
-            <a:off x="10932659" y="4554281"/>
-            <a:ext cx="1255428" cy="264570"/>
+            <a:off x="10932662" y="5124028"/>
+            <a:ext cx="1123871" cy="193348"/>
           </a:xfrm>
           <a:prstGeom prst="flowChartPunchedCard">
             <a:avLst/>
@@ -7668,6 +7760,7 @@
               <a:lumOff val="40000"/>
             </a:schemeClr>
           </a:solidFill>
+          <a:ln w="12700"/>
         </p:spPr>
         <p:style>
           <a:lnRef idx="2">
@@ -7708,8 +7801,8 @@
         </p:nvSpPr>
         <p:spPr>
           <a:xfrm>
-            <a:off x="10932659" y="4818851"/>
-            <a:ext cx="1255428" cy="264570"/>
+            <a:off x="10932662" y="5319259"/>
+            <a:ext cx="1123871" cy="193348"/>
           </a:xfrm>
           <a:prstGeom prst="flowChartPunchedCard">
             <a:avLst/>
@@ -7720,6 +7813,7 @@
               <a:lumOff val="80000"/>
             </a:schemeClr>
           </a:solidFill>
+          <a:ln w="12700"/>
         </p:spPr>
         <p:style>
           <a:lnRef idx="2">
@@ -7756,12 +7850,13 @@
         </p:nvSpPr>
         <p:spPr>
           <a:xfrm>
-            <a:off x="10932659" y="5083421"/>
-            <a:ext cx="1255428" cy="317518"/>
+            <a:off x="10932665" y="5511813"/>
+            <a:ext cx="1123871" cy="232042"/>
           </a:xfrm>
           <a:prstGeom prst="flowChartProcess">
             <a:avLst/>
           </a:prstGeom>
+          <a:ln w="12700"/>
         </p:spPr>
         <p:style>
           <a:lnRef idx="2">
@@ -7798,12 +7893,13 @@
         </p:nvSpPr>
         <p:spPr>
           <a:xfrm>
-            <a:off x="10932659" y="5395449"/>
-            <a:ext cx="1255428" cy="317518"/>
+            <a:off x="10932662" y="5754504"/>
+            <a:ext cx="1123871" cy="232042"/>
           </a:xfrm>
           <a:prstGeom prst="flowChartProcess">
             <a:avLst/>
           </a:prstGeom>
+          <a:ln w="12700"/>
         </p:spPr>
         <p:style>
           <a:lnRef idx="2">
@@ -7840,12 +7936,13 @@
         </p:nvSpPr>
         <p:spPr>
           <a:xfrm>
-            <a:off x="10932661" y="5712967"/>
-            <a:ext cx="1255428" cy="317518"/>
+            <a:off x="10932664" y="5992980"/>
+            <a:ext cx="1123871" cy="232042"/>
           </a:xfrm>
           <a:prstGeom prst="flowChartProcess">
             <a:avLst/>
           </a:prstGeom>
+          <a:ln w="12700"/>
         </p:spPr>
         <p:style>
           <a:lnRef idx="2">
@@ -7882,12 +7979,13 @@
         </p:nvSpPr>
         <p:spPr>
           <a:xfrm>
-            <a:off x="10932659" y="6022234"/>
-            <a:ext cx="1255428" cy="317518"/>
+            <a:off x="10932662" y="6227456"/>
+            <a:ext cx="1123871" cy="232042"/>
           </a:xfrm>
           <a:prstGeom prst="flowChartProcess">
             <a:avLst/>
           </a:prstGeom>
+          <a:ln w="12700"/>
         </p:spPr>
         <p:style>
           <a:lnRef idx="2">
@@ -7924,12 +8022,13 @@
         </p:nvSpPr>
         <p:spPr>
           <a:xfrm>
-            <a:off x="10932662" y="6753568"/>
-            <a:ext cx="1255428" cy="306601"/>
+            <a:off x="10932662" y="7060169"/>
+            <a:ext cx="1123871" cy="229006"/>
           </a:xfrm>
           <a:prstGeom prst="flowChartAlternateProcess">
             <a:avLst/>
           </a:prstGeom>
+          <a:ln w="12700"/>
         </p:spPr>
         <p:style>
           <a:lnRef idx="2">
@@ -7966,12 +8065,13 @@
         </p:nvSpPr>
         <p:spPr>
           <a:xfrm>
-            <a:off x="10932662" y="8468517"/>
-            <a:ext cx="1255428" cy="317518"/>
+            <a:off x="10932662" y="8369136"/>
+            <a:ext cx="1123871" cy="237160"/>
           </a:xfrm>
           <a:prstGeom prst="flowChartProcess">
             <a:avLst/>
           </a:prstGeom>
+          <a:ln w="12700"/>
         </p:spPr>
         <p:style>
           <a:lnRef idx="2">
@@ -8008,12 +8108,13 @@
         </p:nvSpPr>
         <p:spPr>
           <a:xfrm>
-            <a:off x="10932662" y="7848356"/>
-            <a:ext cx="1255428" cy="317518"/>
+            <a:off x="10932662" y="7890386"/>
+            <a:ext cx="1123871" cy="237160"/>
           </a:xfrm>
           <a:prstGeom prst="flowChartProcess">
             <a:avLst/>
           </a:prstGeom>
+          <a:ln w="12700"/>
         </p:spPr>
         <p:style>
           <a:lnRef idx="2">
@@ -8050,12 +8151,13 @@
         </p:nvSpPr>
         <p:spPr>
           <a:xfrm>
-            <a:off x="10932662" y="8165874"/>
-            <a:ext cx="1255428" cy="317518"/>
+            <a:off x="10932662" y="8131976"/>
+            <a:ext cx="1123871" cy="237160"/>
           </a:xfrm>
           <a:prstGeom prst="flowChartProcess">
             <a:avLst/>
           </a:prstGeom>
+          <a:ln w="12700"/>
         </p:spPr>
         <p:style>
           <a:lnRef idx="2">
@@ -8092,8 +8194,8 @@
         </p:nvSpPr>
         <p:spPr>
           <a:xfrm>
-            <a:off x="10932662" y="7319216"/>
-            <a:ext cx="1255428" cy="264570"/>
+            <a:off x="10932662" y="7490388"/>
+            <a:ext cx="1123871" cy="197612"/>
           </a:xfrm>
           <a:prstGeom prst="flowChartPunchedCard">
             <a:avLst/>
@@ -8104,6 +8206,7 @@
               <a:lumOff val="80000"/>
             </a:schemeClr>
           </a:solidFill>
+          <a:ln w="12700"/>
         </p:spPr>
         <p:style>
           <a:lnRef idx="2">
@@ -8140,8 +8243,8 @@
         </p:nvSpPr>
         <p:spPr>
           <a:xfrm>
-            <a:off x="10932662" y="7583786"/>
-            <a:ext cx="1255428" cy="264570"/>
+            <a:off x="10932662" y="7688000"/>
+            <a:ext cx="1123871" cy="197612"/>
           </a:xfrm>
           <a:prstGeom prst="flowChartPunchedCard">
             <a:avLst/>
@@ -8152,6 +8255,7 @@
               <a:lumOff val="80000"/>
             </a:schemeClr>
           </a:solidFill>
+          <a:ln w="12700"/>
         </p:spPr>
         <p:style>
           <a:lnRef idx="2">
@@ -8188,8 +8292,8 @@
         </p:nvSpPr>
         <p:spPr>
           <a:xfrm>
-            <a:off x="10932662" y="7054646"/>
-            <a:ext cx="1255428" cy="264570"/>
+            <a:off x="10932662" y="7292776"/>
+            <a:ext cx="1123871" cy="197612"/>
           </a:xfrm>
           <a:prstGeom prst="flowChartPunchedCard">
             <a:avLst/>
@@ -8200,6 +8304,7 @@
               <a:lumOff val="40000"/>
             </a:schemeClr>
           </a:solidFill>
+          <a:ln w="12700"/>
         </p:spPr>
         <p:style>
           <a:lnRef idx="2">
@@ -8236,12 +8341,13 @@
         </p:nvSpPr>
         <p:spPr>
           <a:xfrm>
-            <a:off x="7004416" y="1011927"/>
-            <a:ext cx="1255428" cy="306601"/>
+            <a:off x="7004416" y="1117406"/>
+            <a:ext cx="1123587" cy="224977"/>
           </a:xfrm>
           <a:prstGeom prst="flowChartAlternateProcess">
             <a:avLst/>
           </a:prstGeom>
+          <a:ln w="12700"/>
         </p:spPr>
         <p:style>
           <a:lnRef idx="2">
@@ -8264,7 +8370,7 @@
             <a:pPr algn="ctr"/>
             <a:r>
               <a:rPr lang="en-US" sz="1200" b="1" dirty="0" err="1" smtClean="0"/>
-              <a:t>paramset</a:t>
+              <a:t>paramsets</a:t>
             </a:r>
             <a:endParaRPr lang="en-US" sz="1200" b="1" dirty="0"/>
           </a:p>
@@ -8278,8 +8384,8 @@
         </p:nvSpPr>
         <p:spPr>
           <a:xfrm>
-            <a:off x="7004416" y="1325180"/>
-            <a:ext cx="1255428" cy="287751"/>
+            <a:off x="7004418" y="1338297"/>
+            <a:ext cx="1123587" cy="202730"/>
           </a:xfrm>
           <a:prstGeom prst="flowChartPredefinedProcess">
             <a:avLst/>
@@ -8290,6 +8396,7 @@
               <a:lumOff val="80000"/>
             </a:schemeClr>
           </a:solidFill>
+          <a:ln w="12700"/>
         </p:spPr>
         <p:style>
           <a:lnRef idx="2">
@@ -8326,12 +8433,13 @@
         </p:nvSpPr>
         <p:spPr>
           <a:xfrm>
-            <a:off x="7004413" y="1877501"/>
-            <a:ext cx="1255428" cy="317518"/>
+            <a:off x="7004413" y="1743091"/>
+            <a:ext cx="1123587" cy="207402"/>
           </a:xfrm>
           <a:prstGeom prst="flowChartProcess">
             <a:avLst/>
           </a:prstGeom>
+          <a:ln w="12700"/>
         </p:spPr>
         <p:style>
           <a:lnRef idx="2">
@@ -8368,12 +8476,13 @@
         </p:nvSpPr>
         <p:spPr>
           <a:xfrm>
-            <a:off x="8982613" y="1044858"/>
-            <a:ext cx="1255428" cy="306601"/>
+            <a:off x="10932662" y="1044392"/>
+            <a:ext cx="1044942" cy="225500"/>
           </a:xfrm>
           <a:prstGeom prst="flowChartAlternateProcess">
             <a:avLst/>
           </a:prstGeom>
+          <a:ln w="12700"/>
         </p:spPr>
         <p:style>
           <a:lnRef idx="2">
@@ -8396,7 +8505,7 @@
             <a:pPr algn="ctr"/>
             <a:r>
               <a:rPr lang="en-US" sz="1200" b="1" dirty="0" err="1" smtClean="0"/>
-              <a:t>bibsource</a:t>
+              <a:t>bibsources</a:t>
             </a:r>
             <a:endParaRPr lang="en-US" sz="1200" b="1" dirty="0"/>
           </a:p>
@@ -8410,8 +8519,8 @@
         </p:nvSpPr>
         <p:spPr>
           <a:xfrm>
-            <a:off x="8982613" y="1346000"/>
-            <a:ext cx="1255428" cy="287751"/>
+            <a:off x="10932662" y="1269892"/>
+            <a:ext cx="1044942" cy="211636"/>
           </a:xfrm>
           <a:prstGeom prst="flowChartPredefinedProcess">
             <a:avLst/>
@@ -8421,6 +8530,7 @@
               <a:lumMod val="85000"/>
             </a:schemeClr>
           </a:solidFill>
+          <a:ln w="12700"/>
         </p:spPr>
         <p:style>
           <a:lnRef idx="2">
@@ -8457,12 +8567,13 @@
         </p:nvSpPr>
         <p:spPr>
           <a:xfrm>
-            <a:off x="8982613" y="1951269"/>
-            <a:ext cx="1255428" cy="317518"/>
+            <a:off x="10932662" y="1717273"/>
+            <a:ext cx="1044942" cy="233529"/>
           </a:xfrm>
           <a:prstGeom prst="flowChartProcess">
             <a:avLst/>
           </a:prstGeom>
+          <a:ln w="12700"/>
         </p:spPr>
         <p:style>
           <a:lnRef idx="2">
@@ -8499,12 +8610,13 @@
         </p:nvSpPr>
         <p:spPr>
           <a:xfrm>
-            <a:off x="8982613" y="1639210"/>
-            <a:ext cx="1255428" cy="317518"/>
+            <a:off x="10932662" y="1476166"/>
+            <a:ext cx="1044942" cy="233529"/>
           </a:xfrm>
           <a:prstGeom prst="flowChartProcess">
             <a:avLst/>
           </a:prstGeom>
+          <a:ln w="12700"/>
         </p:spPr>
         <p:style>
           <a:lnRef idx="2">
@@ -8541,12 +8653,13 @@
         </p:nvSpPr>
         <p:spPr>
           <a:xfrm>
-            <a:off x="8982613" y="2273530"/>
-            <a:ext cx="1255428" cy="317518"/>
+            <a:off x="10932662" y="1958685"/>
+            <a:ext cx="1044942" cy="233529"/>
           </a:xfrm>
           <a:prstGeom prst="flowChartProcess">
             <a:avLst/>
           </a:prstGeom>
+          <a:ln w="12700"/>
         </p:spPr>
         <p:style>
           <a:lnRef idx="2">
@@ -8583,12 +8696,13 @@
         </p:nvSpPr>
         <p:spPr>
           <a:xfrm>
-            <a:off x="8982613" y="2585450"/>
-            <a:ext cx="1255428" cy="317518"/>
+            <a:off x="10932662" y="2202030"/>
+            <a:ext cx="1044942" cy="233529"/>
           </a:xfrm>
           <a:prstGeom prst="flowChartProcess">
             <a:avLst/>
           </a:prstGeom>
+          <a:ln w="12700"/>
         </p:spPr>
         <p:style>
           <a:lnRef idx="2">
@@ -8625,12 +8739,13 @@
         </p:nvSpPr>
         <p:spPr>
           <a:xfrm>
-            <a:off x="8982613" y="2905167"/>
-            <a:ext cx="1255428" cy="317518"/>
+            <a:off x="10932662" y="2436526"/>
+            <a:ext cx="1044942" cy="233529"/>
           </a:xfrm>
           <a:prstGeom prst="flowChartProcess">
             <a:avLst/>
           </a:prstGeom>
+          <a:ln w="12700"/>
         </p:spPr>
         <p:style>
           <a:lnRef idx="2">
@@ -8667,8 +8782,8 @@
         </p:nvSpPr>
         <p:spPr>
           <a:xfrm>
-            <a:off x="10932671" y="1047670"/>
-            <a:ext cx="1255428" cy="264570"/>
+            <a:off x="8982653" y="1287260"/>
+            <a:ext cx="1101233" cy="182180"/>
           </a:xfrm>
           <a:prstGeom prst="flowChartPunchedCard">
             <a:avLst/>
@@ -8678,6 +8793,7 @@
               <a:lumMod val="85000"/>
             </a:schemeClr>
           </a:solidFill>
+          <a:ln w="12700"/>
         </p:spPr>
         <p:style>
           <a:lnRef idx="2">
@@ -8718,12 +8834,13 @@
         </p:nvSpPr>
         <p:spPr>
           <a:xfrm>
-            <a:off x="7004416" y="2187239"/>
-            <a:ext cx="1255428" cy="317518"/>
+            <a:off x="7004416" y="1957998"/>
+            <a:ext cx="1123587" cy="195349"/>
           </a:xfrm>
           <a:prstGeom prst="flowChartProcess">
             <a:avLst/>
           </a:prstGeom>
+          <a:ln w="12700"/>
         </p:spPr>
         <p:style>
           <a:lnRef idx="2">
@@ -8760,12 +8877,13 @@
         </p:nvSpPr>
         <p:spPr>
           <a:xfrm>
-            <a:off x="8982613" y="3216635"/>
-            <a:ext cx="1255428" cy="317518"/>
+            <a:off x="10932662" y="2670055"/>
+            <a:ext cx="1044942" cy="233529"/>
           </a:xfrm>
           <a:prstGeom prst="flowChartProcess">
             <a:avLst/>
           </a:prstGeom>
+          <a:ln w="12700"/>
         </p:spPr>
         <p:style>
           <a:lnRef idx="2">
@@ -8802,12 +8920,13 @@
         </p:nvSpPr>
         <p:spPr>
           <a:xfrm>
-            <a:off x="7004416" y="2504757"/>
-            <a:ext cx="1255428" cy="317518"/>
+            <a:off x="7004416" y="2153348"/>
+            <a:ext cx="1123587" cy="234496"/>
           </a:xfrm>
           <a:prstGeom prst="flowChartProcess">
             <a:avLst/>
           </a:prstGeom>
+          <a:ln w="12700"/>
         </p:spPr>
         <p:style>
           <a:lnRef idx="2">
@@ -8840,22 +8959,22 @@
         <p:nvCxnSpPr>
           <p:cNvPr id="319" name="Elbow Connector 318"/>
           <p:cNvCxnSpPr>
-            <a:stCxn id="308" idx="3"/>
-            <a:endCxn id="314" idx="1"/>
+            <a:stCxn id="308" idx="1"/>
+            <a:endCxn id="314" idx="3"/>
           </p:cNvCxnSpPr>
           <p:nvPr/>
         </p:nvCxnSpPr>
         <p:spPr>
-          <a:xfrm flipV="1">
-            <a:off x="10238041" y="1179955"/>
-            <a:ext cx="694630" cy="309921"/>
+          <a:xfrm rot="10800000" flipV="1">
+            <a:off x="10083886" y="1375710"/>
+            <a:ext cx="848776" cy="2640"/>
           </a:xfrm>
           <a:prstGeom prst="bentConnector3">
             <a:avLst>
               <a:gd name="adj1" fmla="val 50000"/>
             </a:avLst>
           </a:prstGeom>
-          <a:ln>
+          <a:ln w="12700">
             <a:tailEnd type="arrow"/>
           </a:ln>
         </p:spPr>
@@ -8885,15 +9004,15 @@
         </p:nvCxnSpPr>
         <p:spPr>
           <a:xfrm>
-            <a:off x="8259844" y="4171495"/>
-            <a:ext cx="722767" cy="299921"/>
+            <a:off x="8128008" y="3338662"/>
+            <a:ext cx="854636" cy="1885250"/>
           </a:xfrm>
           <a:prstGeom prst="bentConnector3">
             <a:avLst>
               <a:gd name="adj1" fmla="val 50000"/>
             </a:avLst>
           </a:prstGeom>
-          <a:ln>
+          <a:ln w="12700">
             <a:tailEnd type="arrow"/>
           </a:ln>
         </p:spPr>
@@ -8923,15 +9042,15 @@
         </p:nvCxnSpPr>
         <p:spPr>
           <a:xfrm>
-            <a:off x="8259844" y="4171495"/>
-            <a:ext cx="722767" cy="2996915"/>
+            <a:off x="8128008" y="3338662"/>
+            <a:ext cx="854614" cy="4052286"/>
           </a:xfrm>
           <a:prstGeom prst="bentConnector3">
             <a:avLst>
               <a:gd name="adj1" fmla="val 50000"/>
             </a:avLst>
           </a:prstGeom>
-          <a:ln>
+          <a:ln w="12700">
             <a:tailEnd type="arrow"/>
           </a:ln>
         </p:spPr>
@@ -8960,16 +9079,16 @@
           <p:nvPr/>
         </p:nvCxnSpPr>
         <p:spPr>
-          <a:xfrm>
-            <a:off x="10238039" y="4471416"/>
-            <a:ext cx="694620" cy="215150"/>
+          <a:xfrm flipV="1">
+            <a:off x="10083853" y="5220702"/>
+            <a:ext cx="848809" cy="3210"/>
           </a:xfrm>
           <a:prstGeom prst="bentConnector3">
             <a:avLst>
               <a:gd name="adj1" fmla="val 50000"/>
             </a:avLst>
           </a:prstGeom>
-          <a:ln>
+          <a:ln w="12700">
             <a:tailEnd type="arrow"/>
           </a:ln>
         </p:spPr>
@@ -8998,16 +9117,16 @@
           <p:nvPr/>
         </p:nvCxnSpPr>
         <p:spPr>
-          <a:xfrm>
-            <a:off x="10238039" y="4735986"/>
-            <a:ext cx="694620" cy="215150"/>
+          <a:xfrm flipV="1">
+            <a:off x="10083842" y="5415933"/>
+            <a:ext cx="848820" cy="11418"/>
           </a:xfrm>
           <a:prstGeom prst="bentConnector3">
             <a:avLst>
               <a:gd name="adj1" fmla="val 50000"/>
             </a:avLst>
           </a:prstGeom>
-          <a:ln>
+          <a:ln w="12700">
             <a:tailEnd type="arrow"/>
           </a:ln>
         </p:spPr>
@@ -9037,15 +9156,15 @@
         </p:nvCxnSpPr>
         <p:spPr>
           <a:xfrm>
-            <a:off x="10238039" y="7168410"/>
-            <a:ext cx="694623" cy="18521"/>
+            <a:off x="10083811" y="7390948"/>
+            <a:ext cx="848851" cy="634"/>
           </a:xfrm>
           <a:prstGeom prst="bentConnector3">
             <a:avLst>
               <a:gd name="adj1" fmla="val 50000"/>
             </a:avLst>
           </a:prstGeom>
-          <a:ln>
+          <a:ln w="12700">
             <a:tailEnd type="arrow"/>
           </a:ln>
         </p:spPr>
@@ -9075,15 +9194,15 @@
         </p:nvCxnSpPr>
         <p:spPr>
           <a:xfrm>
-            <a:off x="10238039" y="7432980"/>
-            <a:ext cx="694623" cy="18521"/>
+            <a:off x="10083811" y="7588543"/>
+            <a:ext cx="848851" cy="651"/>
           </a:xfrm>
           <a:prstGeom prst="bentConnector3">
             <a:avLst>
               <a:gd name="adj1" fmla="val 50000"/>
             </a:avLst>
           </a:prstGeom>
-          <a:ln>
+          <a:ln w="12700">
             <a:tailEnd type="arrow"/>
           </a:ln>
         </p:spPr>
@@ -9113,15 +9232,15 @@
         </p:nvCxnSpPr>
         <p:spPr>
           <a:xfrm>
-            <a:off x="10238039" y="7697550"/>
-            <a:ext cx="694623" cy="18521"/>
+            <a:off x="10083811" y="7785104"/>
+            <a:ext cx="848851" cy="1702"/>
           </a:xfrm>
           <a:prstGeom prst="bentConnector3">
             <a:avLst>
               <a:gd name="adj1" fmla="val 50000"/>
             </a:avLst>
           </a:prstGeom>
-          <a:ln>
+          <a:ln w="12700">
             <a:tailEnd type="arrow"/>
           </a:ln>
         </p:spPr>
@@ -9148,8 +9267,8 @@
         </p:nvSpPr>
         <p:spPr>
           <a:xfrm>
-            <a:off x="7004416" y="1612931"/>
-            <a:ext cx="1255428" cy="264570"/>
+            <a:off x="7004416" y="1541027"/>
+            <a:ext cx="1123587" cy="195696"/>
           </a:xfrm>
           <a:prstGeom prst="flowChartPunchedCard">
             <a:avLst/>
@@ -9160,6 +9279,7 @@
               <a:lumOff val="80000"/>
             </a:schemeClr>
           </a:solidFill>
+          <a:ln w="12700"/>
         </p:spPr>
         <p:style>
           <a:lnRef idx="2">
@@ -9199,15 +9319,15 @@
         </p:nvCxnSpPr>
         <p:spPr>
           <a:xfrm flipV="1">
-            <a:off x="6105747" y="1745216"/>
-            <a:ext cx="898669" cy="4005057"/>
+            <a:off x="6011332" y="1638875"/>
+            <a:ext cx="993084" cy="3649401"/>
           </a:xfrm>
           <a:prstGeom prst="bentConnector3">
             <a:avLst>
-              <a:gd name="adj1" fmla="val 61942"/>
+              <a:gd name="adj1" fmla="val 50000"/>
             </a:avLst>
           </a:prstGeom>
-          <a:ln>
+          <a:ln w="12700">
             <a:tailEnd type="arrow"/>
           </a:ln>
         </p:spPr>
@@ -9234,12 +9354,13 @@
         </p:nvSpPr>
         <p:spPr>
           <a:xfrm>
-            <a:off x="4850321" y="1236904"/>
-            <a:ext cx="1255428" cy="306601"/>
+            <a:off x="4850321" y="1117406"/>
+            <a:ext cx="1161022" cy="230933"/>
           </a:xfrm>
           <a:prstGeom prst="flowChartAlternateProcess">
             <a:avLst/>
           </a:prstGeom>
+          <a:ln w="12700"/>
         </p:spPr>
         <p:style>
           <a:lnRef idx="2">
@@ -9276,8 +9397,8 @@
         </p:nvSpPr>
         <p:spPr>
           <a:xfrm>
-            <a:off x="4850321" y="1543505"/>
-            <a:ext cx="1255428" cy="264570"/>
+            <a:off x="4850321" y="1348339"/>
+            <a:ext cx="1161022" cy="195813"/>
           </a:xfrm>
           <a:prstGeom prst="flowChartPunchedCard">
             <a:avLst/>
@@ -9288,6 +9409,7 @@
               <a:lumOff val="80000"/>
             </a:schemeClr>
           </a:solidFill>
+          <a:ln w="12700"/>
         </p:spPr>
         <p:style>
           <a:lnRef idx="2">
@@ -9324,8 +9446,8 @@
         </p:nvSpPr>
         <p:spPr>
           <a:xfrm>
-            <a:off x="4850321" y="1808075"/>
-            <a:ext cx="1255428" cy="264570"/>
+            <a:off x="4850321" y="1544152"/>
+            <a:ext cx="1161022" cy="216463"/>
           </a:xfrm>
           <a:prstGeom prst="flowChartPunchedCard">
             <a:avLst/>
@@ -9336,6 +9458,7 @@
               <a:lumOff val="80000"/>
             </a:schemeClr>
           </a:solidFill>
+          <a:ln w="12700"/>
         </p:spPr>
         <p:style>
           <a:lnRef idx="2">
@@ -9372,12 +9495,13 @@
         </p:nvSpPr>
         <p:spPr>
           <a:xfrm>
-            <a:off x="2716564" y="1024835"/>
-            <a:ext cx="1255428" cy="306601"/>
+            <a:off x="2703863" y="1150204"/>
+            <a:ext cx="1255428" cy="210418"/>
           </a:xfrm>
           <a:prstGeom prst="flowChartAlternateProcess">
             <a:avLst/>
           </a:prstGeom>
+          <a:ln w="12700"/>
         </p:spPr>
         <p:style>
           <a:lnRef idx="2">
@@ -9414,8 +9538,8 @@
         </p:nvSpPr>
         <p:spPr>
           <a:xfrm>
-            <a:off x="2716564" y="1323986"/>
-            <a:ext cx="1255428" cy="264570"/>
+            <a:off x="2703863" y="1363195"/>
+            <a:ext cx="1255428" cy="170046"/>
           </a:xfrm>
           <a:prstGeom prst="flowChartPunchedCard">
             <a:avLst/>
@@ -9426,6 +9550,7 @@
               <a:lumOff val="80000"/>
             </a:schemeClr>
           </a:solidFill>
+          <a:ln w="12700"/>
         </p:spPr>
         <p:style>
           <a:lnRef idx="2">
@@ -9470,8 +9595,8 @@
         </p:nvSpPr>
         <p:spPr>
           <a:xfrm>
-            <a:off x="2716564" y="1596006"/>
-            <a:ext cx="1255428" cy="264570"/>
+            <a:off x="2703863" y="1533241"/>
+            <a:ext cx="1255428" cy="195143"/>
           </a:xfrm>
           <a:prstGeom prst="flowChartPunchedCard">
             <a:avLst/>
@@ -9482,6 +9607,7 @@
               <a:lumOff val="80000"/>
             </a:schemeClr>
           </a:solidFill>
+          <a:ln w="12700"/>
         </p:spPr>
         <p:style>
           <a:lnRef idx="2">
@@ -9518,12 +9644,13 @@
         </p:nvSpPr>
         <p:spPr>
           <a:xfrm>
-            <a:off x="2716564" y="1856563"/>
-            <a:ext cx="1255428" cy="317518"/>
+            <a:off x="2703863" y="1728936"/>
+            <a:ext cx="1255428" cy="215911"/>
           </a:xfrm>
           <a:prstGeom prst="flowChartProcess">
             <a:avLst/>
           </a:prstGeom>
+          <a:ln w="12700"/>
         </p:spPr>
         <p:style>
           <a:lnRef idx="2">
@@ -9560,12 +9687,13 @@
         </p:nvSpPr>
         <p:spPr>
           <a:xfrm>
-            <a:off x="2716564" y="2171462"/>
-            <a:ext cx="1255428" cy="317518"/>
+            <a:off x="2703863" y="1944847"/>
+            <a:ext cx="1255428" cy="196605"/>
           </a:xfrm>
           <a:prstGeom prst="flowChartProcess">
             <a:avLst/>
           </a:prstGeom>
+          <a:ln w="12700"/>
         </p:spPr>
         <p:style>
           <a:lnRef idx="2">
@@ -9602,12 +9730,13 @@
         </p:nvSpPr>
         <p:spPr>
           <a:xfrm>
-            <a:off x="4850321" y="2065290"/>
-            <a:ext cx="1255428" cy="317518"/>
+            <a:off x="4850311" y="1736723"/>
+            <a:ext cx="1161022" cy="213770"/>
           </a:xfrm>
           <a:prstGeom prst="flowChartProcess">
             <a:avLst/>
           </a:prstGeom>
+          <a:ln w="12700"/>
         </p:spPr>
         <p:style>
           <a:lnRef idx="2">
@@ -9644,12 +9773,13 @@
         </p:nvSpPr>
         <p:spPr>
           <a:xfrm>
-            <a:off x="4850321" y="2380189"/>
-            <a:ext cx="1255428" cy="317518"/>
+            <a:off x="4850311" y="1950493"/>
+            <a:ext cx="1161022" cy="190959"/>
           </a:xfrm>
           <a:prstGeom prst="flowChartProcess">
             <a:avLst/>
           </a:prstGeom>
+          <a:ln w="12700"/>
         </p:spPr>
         <p:style>
           <a:lnRef idx="2">
@@ -9689,15 +9819,15 @@
         </p:nvCxnSpPr>
         <p:spPr>
           <a:xfrm rot="10800000" flipV="1">
-            <a:off x="6105750" y="1469056"/>
-            <a:ext cx="898667" cy="206734"/>
+            <a:off x="6011344" y="1439662"/>
+            <a:ext cx="993075" cy="6584"/>
           </a:xfrm>
           <a:prstGeom prst="bentConnector3">
             <a:avLst>
               <a:gd name="adj1" fmla="val 50000"/>
             </a:avLst>
           </a:prstGeom>
-          <a:ln>
+          <a:ln w="12700">
             <a:tailEnd type="arrow"/>
           </a:ln>
         </p:spPr>
@@ -9727,8 +9857,8 @@
         </p:nvCxnSpPr>
         <p:spPr>
           <a:xfrm flipV="1">
-            <a:off x="3971993" y="1940360"/>
-            <a:ext cx="878328" cy="5259871"/>
+            <a:off x="3877733" y="1652384"/>
+            <a:ext cx="972588" cy="5037308"/>
           </a:xfrm>
           <a:prstGeom prst="bentConnector3">
             <a:avLst>
@@ -9764,9 +9894,9 @@
           <p:nvPr/>
         </p:nvCxnSpPr>
         <p:spPr>
-          <a:xfrm rot="10800000">
-            <a:off x="3971993" y="1456272"/>
-            <a:ext cx="878329" cy="219519"/>
+          <a:xfrm rot="10800000" flipV="1">
+            <a:off x="3959291" y="1446246"/>
+            <a:ext cx="891030" cy="1972"/>
           </a:xfrm>
           <a:prstGeom prst="bentConnector3">
             <a:avLst>
@@ -9803,15 +9933,15 @@
         </p:nvCxnSpPr>
         <p:spPr>
           <a:xfrm flipV="1">
-            <a:off x="1964514" y="1728291"/>
-            <a:ext cx="752050" cy="4455430"/>
+            <a:off x="1828804" y="1630813"/>
+            <a:ext cx="875059" cy="4427794"/>
           </a:xfrm>
           <a:prstGeom prst="bentConnector3">
             <a:avLst>
-              <a:gd name="adj1" fmla="val 25026"/>
+              <a:gd name="adj1" fmla="val 50000"/>
             </a:avLst>
           </a:prstGeom>
-          <a:ln>
+          <a:ln w="12700">
             <a:tailEnd type="arrow"/>
           </a:ln>
         </p:spPr>
@@ -9838,12 +9968,13 @@
         </p:nvSpPr>
         <p:spPr>
           <a:xfrm>
-            <a:off x="7004413" y="2824921"/>
-            <a:ext cx="1255428" cy="317518"/>
+            <a:off x="7004413" y="2387844"/>
+            <a:ext cx="1123587" cy="237747"/>
           </a:xfrm>
           <a:prstGeom prst="flowChartProcess">
             <a:avLst/>
           </a:prstGeom>
+          <a:ln w="12700"/>
         </p:spPr>
         <p:style>
           <a:lnRef idx="2">
@@ -9880,7 +10011,7 @@
         </p:nvSpPr>
         <p:spPr>
           <a:xfrm>
-            <a:off x="4713260" y="289745"/>
+            <a:off x="3635223" y="230096"/>
             <a:ext cx="4856358" cy="338554"/>
           </a:xfrm>
           <a:prstGeom prst="rect">
@@ -9896,7 +10027,15 @@
           <a:p>
             <a:r>
               <a:rPr lang="en-US" sz="1600" dirty="0" smtClean="0"/>
-              <a:t>GEMSFIT SQL RDBMS Chart (DK &amp; DM draft 1, 21.01.13)  </a:t>
+              <a:t>GEMSFIT SQL RDBMS Chart (DK &amp; DM draft </a:t>
+            </a:r>
+            <a:r>
+              <a:rPr lang="en-US" sz="1600" dirty="0" smtClean="0"/>
+              <a:t>2, 22.01.13</a:t>
+            </a:r>
+            <a:r>
+              <a:rPr lang="en-US" sz="1600" dirty="0" smtClean="0"/>
+              <a:t>)  </a:t>
             </a:r>
             <a:endParaRPr lang="en-US" sz="1600" dirty="0"/>
           </a:p>
@@ -9910,12 +10049,13 @@
         </p:nvSpPr>
         <p:spPr>
           <a:xfrm>
-            <a:off x="2716565" y="8608755"/>
-            <a:ext cx="1255428" cy="317518"/>
+            <a:off x="2729264" y="7964986"/>
+            <a:ext cx="1148469" cy="251035"/>
           </a:xfrm>
           <a:prstGeom prst="flowChartProcess">
             <a:avLst/>
           </a:prstGeom>
+          <a:ln w="12700"/>
         </p:spPr>
         <p:style>
           <a:lnRef idx="2">
@@ -9952,8 +10092,8 @@
         </p:nvSpPr>
         <p:spPr>
           <a:xfrm>
-            <a:off x="2716565" y="2488980"/>
-            <a:ext cx="1255428" cy="264570"/>
+            <a:off x="2703863" y="2141452"/>
+            <a:ext cx="1255428" cy="205170"/>
           </a:xfrm>
           <a:prstGeom prst="flowChartPunchedCard">
             <a:avLst/>
@@ -9964,6 +10104,7 @@
               <a:lumOff val="40000"/>
             </a:schemeClr>
           </a:solidFill>
+          <a:ln w="12700"/>
         </p:spPr>
         <p:style>
           <a:lnRef idx="2">
@@ -10000,8 +10141,8 @@
         </p:nvSpPr>
         <p:spPr>
           <a:xfrm>
-            <a:off x="4850311" y="2689990"/>
-            <a:ext cx="1255428" cy="264570"/>
+            <a:off x="4850311" y="2153348"/>
+            <a:ext cx="1161022" cy="221006"/>
           </a:xfrm>
           <a:prstGeom prst="flowChartPunchedCard">
             <a:avLst/>
@@ -10012,6 +10153,7 @@
               <a:lumOff val="40000"/>
             </a:schemeClr>
           </a:solidFill>
+          <a:ln w="12700"/>
         </p:spPr>
         <p:style>
           <a:lnRef idx="2">
@@ -10048,8 +10190,8 @@
         </p:nvSpPr>
         <p:spPr>
           <a:xfrm>
-            <a:off x="2703864" y="4543039"/>
-            <a:ext cx="1255428" cy="264570"/>
+            <a:off x="2703863" y="3672188"/>
+            <a:ext cx="1097670" cy="230898"/>
           </a:xfrm>
           <a:prstGeom prst="flowChartPunchedCard">
             <a:avLst/>
@@ -10060,6 +10202,7 @@
               <a:lumOff val="40000"/>
             </a:schemeClr>
           </a:solidFill>
+          <a:ln w="12700"/>
         </p:spPr>
         <p:style>
           <a:lnRef idx="2">
@@ -10096,8 +10239,8 @@
         </p:nvSpPr>
         <p:spPr>
           <a:xfrm>
-            <a:off x="709082" y="8496951"/>
-            <a:ext cx="1255428" cy="264570"/>
+            <a:off x="709082" y="7609157"/>
+            <a:ext cx="1119718" cy="247399"/>
           </a:xfrm>
           <a:prstGeom prst="flowChartPunchedCard">
             <a:avLst/>
@@ -10108,6 +10251,7 @@
               <a:lumOff val="40000"/>
             </a:schemeClr>
           </a:solidFill>
+          <a:ln w="12700"/>
         </p:spPr>
         <p:style>
           <a:lnRef idx="2">
@@ -10144,8 +10288,8 @@
         </p:nvSpPr>
         <p:spPr>
           <a:xfrm>
-            <a:off x="4850322" y="4565003"/>
-            <a:ext cx="1255428" cy="264570"/>
+            <a:off x="4850322" y="4411829"/>
+            <a:ext cx="1161022" cy="202673"/>
           </a:xfrm>
           <a:prstGeom prst="flowChartPunchedCard">
             <a:avLst/>
@@ -10156,6 +10300,7 @@
               <a:lumOff val="40000"/>
             </a:schemeClr>
           </a:solidFill>
+          <a:ln w="12700"/>
         </p:spPr>
         <p:style>
           <a:lnRef idx="2">
@@ -10192,8 +10337,8 @@
         </p:nvSpPr>
         <p:spPr>
           <a:xfrm>
-            <a:off x="7004413" y="8747962"/>
-            <a:ext cx="1255428" cy="264570"/>
+            <a:off x="7080614" y="8588391"/>
+            <a:ext cx="1123604" cy="215517"/>
           </a:xfrm>
           <a:prstGeom prst="flowChartPunchedCard">
             <a:avLst/>
@@ -10204,6 +10349,7 @@
               <a:lumOff val="40000"/>
             </a:schemeClr>
           </a:solidFill>
+          <a:ln w="12700"/>
         </p:spPr>
         <p:style>
           <a:lnRef idx="2">
@@ -10240,8 +10386,8 @@
         </p:nvSpPr>
         <p:spPr>
           <a:xfrm>
-            <a:off x="8982611" y="8780954"/>
-            <a:ext cx="1255428" cy="264570"/>
+            <a:off x="8982633" y="8588391"/>
+            <a:ext cx="1101189" cy="202179"/>
           </a:xfrm>
           <a:prstGeom prst="flowChartPunchedCard">
             <a:avLst/>
@@ -10252,6 +10398,7 @@
               <a:lumOff val="40000"/>
             </a:schemeClr>
           </a:solidFill>
+          <a:ln w="12700"/>
         </p:spPr>
         <p:style>
           <a:lnRef idx="2">
@@ -10288,8 +10435,8 @@
         </p:nvSpPr>
         <p:spPr>
           <a:xfrm>
-            <a:off x="10932659" y="8793988"/>
-            <a:ext cx="1255428" cy="264570"/>
+            <a:off x="10932662" y="8606296"/>
+            <a:ext cx="1123871" cy="197612"/>
           </a:xfrm>
           <a:prstGeom prst="flowChartPunchedCard">
             <a:avLst/>
@@ -10300,6 +10447,94 @@
               <a:lumOff val="40000"/>
             </a:schemeClr>
           </a:solidFill>
+          <a:ln w="12700"/>
+        </p:spPr>
+        <p:style>
+          <a:lnRef idx="2">
+            <a:schemeClr val="dk1"/>
+          </a:lnRef>
+          <a:fillRef idx="1">
+            <a:schemeClr val="lt1"/>
+          </a:fillRef>
+          <a:effectRef idx="0">
+            <a:schemeClr val="dk1"/>
+          </a:effectRef>
+          <a:fontRef idx="minor">
+            <a:schemeClr val="dk1"/>
+          </a:fontRef>
+        </p:style>
+        <p:txBody>
+          <a:bodyPr rtlCol="0" anchor="ctr"/>
+          <a:lstStyle/>
+          <a:p>
+            <a:pPr algn="ctr"/>
+            <a:r>
+              <a:rPr lang="en-US" sz="1100" b="1" dirty="0" err="1" smtClean="0"/>
+              <a:t>units_id</a:t>
+            </a:r>
+            <a:endParaRPr lang="en-US" sz="1100" b="1" dirty="0"/>
+          </a:p>
+        </p:txBody>
+      </p:sp>
+      <p:cxnSp>
+        <p:nvCxnSpPr>
+          <p:cNvPr id="175" name="Elbow Connector 174"/>
+          <p:cNvCxnSpPr>
+            <a:stCxn id="149" idx="3"/>
+            <a:endCxn id="243" idx="1"/>
+          </p:cNvCxnSpPr>
+          <p:nvPr/>
+        </p:nvCxnSpPr>
+        <p:spPr>
+          <a:xfrm flipV="1">
+            <a:off x="8204218" y="7785104"/>
+            <a:ext cx="778404" cy="4512"/>
+          </a:xfrm>
+          <a:prstGeom prst="bentConnector3">
+            <a:avLst>
+              <a:gd name="adj1" fmla="val 50000"/>
+            </a:avLst>
+          </a:prstGeom>
+          <a:ln w="12700">
+            <a:tailEnd type="arrow"/>
+          </a:ln>
+        </p:spPr>
+        <p:style>
+          <a:lnRef idx="1">
+            <a:schemeClr val="dk1"/>
+          </a:lnRef>
+          <a:fillRef idx="0">
+            <a:schemeClr val="dk1"/>
+          </a:fillRef>
+          <a:effectRef idx="0">
+            <a:schemeClr val="dk1"/>
+          </a:effectRef>
+          <a:fontRef idx="minor">
+            <a:schemeClr val="tx1"/>
+          </a:fontRef>
+        </p:style>
+      </p:cxnSp>
+      <p:sp>
+        <p:nvSpPr>
+          <p:cNvPr id="296" name="Card 295"/>
+          <p:cNvSpPr/>
+          <p:nvPr/>
+        </p:nvSpPr>
+        <p:spPr>
+          <a:xfrm>
+            <a:off x="731127" y="3940596"/>
+            <a:ext cx="1097670" cy="218170"/>
+          </a:xfrm>
+          <a:prstGeom prst="flowChartPunchedCard">
+            <a:avLst/>
+          </a:prstGeom>
+          <a:solidFill>
+            <a:schemeClr val="accent4">
+              <a:lumMod val="60000"/>
+              <a:lumOff val="40000"/>
+            </a:schemeClr>
+          </a:solidFill>
+          <a:ln w="12700"/>
         </p:spPr>
         <p:style>
           <a:lnRef idx="2">
@@ -10338,6 +10573,13 @@
   <p:clrMapOvr>
     <a:masterClrMapping/>
   </p:clrMapOvr>
+  <p:timing>
+    <p:tnLst>
+      <p:par>
+        <p:cTn xmlns:p14="http://schemas.microsoft.com/office/powerpoint/2010/main" id="1" dur="indefinite" restart="never" nodeType="tmRoot"/>
+      </p:par>
+    </p:tnLst>
+  </p:timing>
 </p:sld>
 </file>
 

</xml_diff>